<commit_message>
Initial checkin on 310 lab code directory. Finalization near morning. lab docs being created tomorrow along with refinements to presentations.
</commit_message>
<xml_diff>
--- a/310/310.pptx
+++ b/310/310.pptx
@@ -1627,7 +1627,7 @@
           <a:p>
             <a:pPr marL="79375" eaLnBrk="1" hangingPunct="1"/>
             <a:r>
-              <a:rPr lang="en-US" dirty="0">
+              <a:rPr lang="en-US" dirty="0" smtClean="0">
                 <a:solidFill>
                   <a:srgbClr val="000000"/>
                 </a:solidFill>
@@ -1636,8 +1636,98 @@
                 <a:cs typeface="Lucida Grande" charset="0"/>
                 <a:sym typeface="Lucida Grande" charset="0"/>
               </a:rPr>
-              <a:t>Present the agenda…</a:t>
+              <a:t>Quick overview of building a good app. More and more apps are adopting a custom tab bar as</a:t>
             </a:r>
+            <a:r>
+              <a:rPr lang="en-US" baseline="0" dirty="0" smtClean="0">
+                <a:solidFill>
+                  <a:srgbClr val="000000"/>
+                </a:solidFill>
+                <a:latin typeface="Lucida Grande" charset="0"/>
+                <a:ea typeface="ＭＳ Ｐゴシック" charset="0"/>
+                <a:cs typeface="Lucida Grande" charset="0"/>
+                <a:sym typeface="Lucida Grande" charset="0"/>
+              </a:rPr>
+              <a:t> part of their application. This is a trend that is constantly going to evolve, but provides a conundrum to Titanium users that don’t have custom module experience. How to I replicate that experience?</a:t>
+            </a:r>
+          </a:p>
+          <a:p>
+            <a:pPr marL="79375" eaLnBrk="1" hangingPunct="1"/>
+            <a:endParaRPr lang="en-US" baseline="0" dirty="0" smtClean="0">
+              <a:solidFill>
+                <a:srgbClr val="000000"/>
+              </a:solidFill>
+              <a:latin typeface="Lucida Grande" charset="0"/>
+              <a:ea typeface="ＭＳ Ｐゴシック" charset="0"/>
+              <a:cs typeface="Lucida Grande" charset="0"/>
+              <a:sym typeface="Lucida Grande" charset="0"/>
+            </a:endParaRPr>
+          </a:p>
+          <a:p>
+            <a:pPr marL="79375" eaLnBrk="1" hangingPunct="1"/>
+            <a:r>
+              <a:rPr lang="en-US" baseline="0" dirty="0" smtClean="0">
+                <a:solidFill>
+                  <a:srgbClr val="000000"/>
+                </a:solidFill>
+                <a:latin typeface="Lucida Grande" charset="0"/>
+                <a:ea typeface="ＭＳ Ｐゴシック" charset="0"/>
+                <a:cs typeface="Lucida Grande" charset="0"/>
+                <a:sym typeface="Lucida Grande" charset="0"/>
+              </a:rPr>
+              <a:t>While this largely focuses on how to develop a custom tab bar, largely this is about brand and using components that are not normally used for improved design.</a:t>
+            </a:r>
+          </a:p>
+          <a:p>
+            <a:pPr marL="79375" eaLnBrk="1" hangingPunct="1"/>
+            <a:endParaRPr lang="en-US" baseline="0" dirty="0" smtClean="0">
+              <a:solidFill>
+                <a:srgbClr val="000000"/>
+              </a:solidFill>
+              <a:latin typeface="Lucida Grande" charset="0"/>
+              <a:ea typeface="ＭＳ Ｐゴシック" charset="0"/>
+              <a:cs typeface="Lucida Grande" charset="0"/>
+              <a:sym typeface="Lucida Grande" charset="0"/>
+            </a:endParaRPr>
+          </a:p>
+          <a:p>
+            <a:pPr marL="79375" eaLnBrk="1" hangingPunct="1"/>
+            <a:r>
+              <a:rPr lang="en-US" baseline="0" dirty="0" smtClean="0">
+                <a:solidFill>
+                  <a:srgbClr val="000000"/>
+                </a:solidFill>
+                <a:latin typeface="Lucida Grande" charset="0"/>
+                <a:ea typeface="ＭＳ Ｐゴシック" charset="0"/>
+                <a:cs typeface="Lucida Grande" charset="0"/>
+                <a:sym typeface="Lucida Grande" charset="0"/>
+              </a:rPr>
+              <a:t>We’ll discuss custom navigation and how to get the most out of your components. Since most of you know how to style and improve upon the existing components, I would encourage you to think how those can be used in different ways to vary the user interface to help drive the experience of your consumer.</a:t>
+            </a:r>
+          </a:p>
+          <a:p>
+            <a:pPr marL="79375" eaLnBrk="1" hangingPunct="1"/>
+            <a:endParaRPr lang="en-US" baseline="0" dirty="0" smtClean="0">
+              <a:solidFill>
+                <a:srgbClr val="000000"/>
+              </a:solidFill>
+              <a:latin typeface="Lucida Grande" charset="0"/>
+              <a:ea typeface="ＭＳ Ｐゴシック" charset="0"/>
+              <a:cs typeface="Lucida Grande" charset="0"/>
+              <a:sym typeface="Lucida Grande" charset="0"/>
+            </a:endParaRPr>
+          </a:p>
+          <a:p>
+            <a:pPr marL="79375" eaLnBrk="1" hangingPunct="1"/>
+            <a:endParaRPr lang="en-US" dirty="0">
+              <a:solidFill>
+                <a:srgbClr val="000000"/>
+              </a:solidFill>
+              <a:latin typeface="Lucida Grande" charset="0"/>
+              <a:ea typeface="ＭＳ Ｐゴシック" charset="0"/>
+              <a:cs typeface="Lucida Grande" charset="0"/>
+              <a:sym typeface="Lucida Grande" charset="0"/>
+            </a:endParaRPr>
           </a:p>
         </p:txBody>
       </p:sp>
@@ -1830,6 +1920,199 @@
                 <a:tab pos="5562600" algn="l"/>
               </a:tabLst>
             </a:pPr>
+            <a:r>
+              <a:rPr lang="en-US" dirty="0" smtClean="0">
+                <a:solidFill>
+                  <a:srgbClr val="122956"/>
+                </a:solidFill>
+                <a:latin typeface="Lucida Grande" charset="0"/>
+                <a:ea typeface="ＭＳ Ｐゴシック" charset="0"/>
+                <a:cs typeface="Lucida Grande" charset="0"/>
+                <a:sym typeface="Lucida Grande" charset="0"/>
+              </a:rPr>
+              <a:t>If you do not have a</a:t>
+            </a:r>
+            <a:r>
+              <a:rPr lang="en-US" baseline="0" dirty="0" smtClean="0">
+                <a:solidFill>
+                  <a:srgbClr val="122956"/>
+                </a:solidFill>
+                <a:latin typeface="Lucida Grande" charset="0"/>
+                <a:ea typeface="ＭＳ Ｐゴシック" charset="0"/>
+                <a:cs typeface="Lucida Grande" charset="0"/>
+                <a:sym typeface="Lucida Grande" charset="0"/>
+              </a:rPr>
+              <a:t> brand document, then this should be one of your first objectives. There are several ways to go about getting one, and developing one, but the fact is that you should at the least have a cheat sheet describing your strategy, consumer needs, and a list of your primary and secondary colors, fonts and icons if developed.</a:t>
+            </a:r>
+          </a:p>
+          <a:p>
+            <a:pPr marL="420688" indent="-341313" eaLnBrk="1" hangingPunct="1">
+              <a:spcBef>
+                <a:spcPts val="600"/>
+              </a:spcBef>
+              <a:tabLst>
+                <a:tab pos="114300" algn="l"/>
+                <a:tab pos="990600" algn="l"/>
+                <a:tab pos="1905000" algn="l"/>
+                <a:tab pos="2819400" algn="l"/>
+                <a:tab pos="3733800" algn="l"/>
+                <a:tab pos="4648200" algn="l"/>
+                <a:tab pos="5562600" algn="l"/>
+              </a:tabLst>
+            </a:pPr>
+            <a:endParaRPr lang="en-US" baseline="0" dirty="0" smtClean="0">
+              <a:solidFill>
+                <a:srgbClr val="122956"/>
+              </a:solidFill>
+              <a:latin typeface="Lucida Grande" charset="0"/>
+              <a:ea typeface="ＭＳ Ｐゴシック" charset="0"/>
+              <a:cs typeface="Lucida Grande" charset="0"/>
+              <a:sym typeface="Lucida Grande" charset="0"/>
+            </a:endParaRPr>
+          </a:p>
+          <a:p>
+            <a:pPr marL="420688" indent="-341313" eaLnBrk="1" hangingPunct="1">
+              <a:spcBef>
+                <a:spcPts val="600"/>
+              </a:spcBef>
+              <a:buFontTx/>
+              <a:buChar char="-"/>
+              <a:tabLst>
+                <a:tab pos="114300" algn="l"/>
+                <a:tab pos="990600" algn="l"/>
+                <a:tab pos="1905000" algn="l"/>
+                <a:tab pos="2819400" algn="l"/>
+                <a:tab pos="3733800" algn="l"/>
+                <a:tab pos="4648200" algn="l"/>
+                <a:tab pos="5562600" algn="l"/>
+              </a:tabLst>
+            </a:pPr>
+            <a:r>
+              <a:rPr lang="en-US" baseline="0" dirty="0" smtClean="0">
+                <a:solidFill>
+                  <a:srgbClr val="122956"/>
+                </a:solidFill>
+                <a:latin typeface="Lucida Grande" charset="0"/>
+                <a:ea typeface="ＭＳ Ｐゴシック" charset="0"/>
+                <a:cs typeface="Lucida Grande" charset="0"/>
+                <a:sym typeface="Lucida Grande" charset="0"/>
+              </a:rPr>
+              <a:t>These should revolve around understanding your consumer, not yourselves! If you understand your consumers trends, then it will help dictate the design elements</a:t>
+            </a:r>
+          </a:p>
+          <a:p>
+            <a:pPr marL="420688" indent="-341313" eaLnBrk="1" hangingPunct="1">
+              <a:spcBef>
+                <a:spcPts val="600"/>
+              </a:spcBef>
+              <a:buFontTx/>
+              <a:buChar char="-"/>
+              <a:tabLst>
+                <a:tab pos="114300" algn="l"/>
+                <a:tab pos="990600" algn="l"/>
+                <a:tab pos="1905000" algn="l"/>
+                <a:tab pos="2819400" algn="l"/>
+                <a:tab pos="3733800" algn="l"/>
+                <a:tab pos="4648200" algn="l"/>
+                <a:tab pos="5562600" algn="l"/>
+              </a:tabLst>
+            </a:pPr>
+            <a:endParaRPr lang="en-US" baseline="0" dirty="0" smtClean="0">
+              <a:solidFill>
+                <a:srgbClr val="122956"/>
+              </a:solidFill>
+              <a:latin typeface="Lucida Grande" charset="0"/>
+              <a:ea typeface="ＭＳ Ｐゴシック" charset="0"/>
+              <a:cs typeface="Lucida Grande" charset="0"/>
+              <a:sym typeface="Lucida Grande" charset="0"/>
+            </a:endParaRPr>
+          </a:p>
+          <a:p>
+            <a:pPr marL="420688" indent="-341313" eaLnBrk="1" hangingPunct="1">
+              <a:spcBef>
+                <a:spcPts val="600"/>
+              </a:spcBef>
+              <a:buFontTx/>
+              <a:buChar char="-"/>
+              <a:tabLst>
+                <a:tab pos="114300" algn="l"/>
+                <a:tab pos="990600" algn="l"/>
+                <a:tab pos="1905000" algn="l"/>
+                <a:tab pos="2819400" algn="l"/>
+                <a:tab pos="3733800" algn="l"/>
+                <a:tab pos="4648200" algn="l"/>
+                <a:tab pos="5562600" algn="l"/>
+              </a:tabLst>
+            </a:pPr>
+            <a:r>
+              <a:rPr lang="en-US" baseline="0" dirty="0" smtClean="0">
+                <a:solidFill>
+                  <a:srgbClr val="122956"/>
+                </a:solidFill>
+                <a:latin typeface="Lucida Grande" charset="0"/>
+                <a:ea typeface="ＭＳ Ｐゴシック" charset="0"/>
+                <a:cs typeface="Lucida Grande" charset="0"/>
+                <a:sym typeface="Lucida Grande" charset="0"/>
+              </a:rPr>
+              <a:t>Develop a single page brand that everyone can adopt. This will help tremendously so that there is no lack of consistency in design and implementation.</a:t>
+            </a:r>
+          </a:p>
+          <a:p>
+            <a:pPr marL="420688" indent="-341313" eaLnBrk="1" hangingPunct="1">
+              <a:spcBef>
+                <a:spcPts val="600"/>
+              </a:spcBef>
+              <a:buFontTx/>
+              <a:buChar char="-"/>
+              <a:tabLst>
+                <a:tab pos="114300" algn="l"/>
+                <a:tab pos="990600" algn="l"/>
+                <a:tab pos="1905000" algn="l"/>
+                <a:tab pos="2819400" algn="l"/>
+                <a:tab pos="3733800" algn="l"/>
+                <a:tab pos="4648200" algn="l"/>
+                <a:tab pos="5562600" algn="l"/>
+              </a:tabLst>
+            </a:pPr>
+            <a:endParaRPr lang="en-US" baseline="0" dirty="0" smtClean="0">
+              <a:solidFill>
+                <a:srgbClr val="122956"/>
+              </a:solidFill>
+              <a:latin typeface="Lucida Grande" charset="0"/>
+              <a:ea typeface="ＭＳ Ｐゴシック" charset="0"/>
+              <a:cs typeface="Lucida Grande" charset="0"/>
+              <a:sym typeface="Lucida Grande" charset="0"/>
+            </a:endParaRPr>
+          </a:p>
+          <a:p>
+            <a:pPr marL="420688" indent="-341313" eaLnBrk="1" hangingPunct="1">
+              <a:spcBef>
+                <a:spcPts val="600"/>
+              </a:spcBef>
+              <a:buFontTx/>
+              <a:buChar char="-"/>
+              <a:tabLst>
+                <a:tab pos="114300" algn="l"/>
+                <a:tab pos="990600" algn="l"/>
+                <a:tab pos="1905000" algn="l"/>
+                <a:tab pos="2819400" algn="l"/>
+                <a:tab pos="3733800" algn="l"/>
+                <a:tab pos="4648200" algn="l"/>
+                <a:tab pos="5562600" algn="l"/>
+              </a:tabLst>
+            </a:pPr>
+            <a:r>
+              <a:rPr lang="en-US" baseline="0" dirty="0" smtClean="0">
+                <a:solidFill>
+                  <a:srgbClr val="122956"/>
+                </a:solidFill>
+                <a:latin typeface="Lucida Grande" charset="0"/>
+                <a:ea typeface="ＭＳ Ｐゴシック" charset="0"/>
+                <a:cs typeface="Lucida Grande" charset="0"/>
+                <a:sym typeface="Lucida Grande" charset="0"/>
+              </a:rPr>
+              <a:t>Lastly understand the emotion of your company, the culture behind it, locate the style of how you represent the brand and where your targets are. This will help develop artistic style and guide in the principles of what the app should convey to the user.</a:t>
+            </a:r>
             <a:endParaRPr lang="en-US" dirty="0">
               <a:solidFill>
                 <a:srgbClr val="122956"/>
@@ -1935,6 +2218,136 @@
                 <a:tab pos="5562600" algn="l"/>
               </a:tabLst>
             </a:pPr>
+            <a:r>
+              <a:rPr lang="en-US" dirty="0" smtClean="0">
+                <a:solidFill>
+                  <a:srgbClr val="122956"/>
+                </a:solidFill>
+                <a:latin typeface="Lucida Grande" charset="0"/>
+                <a:ea typeface="ＭＳ Ｐゴシック" charset="0"/>
+                <a:cs typeface="Lucida Grande" charset="0"/>
+                <a:sym typeface="Lucida Grande" charset="0"/>
+              </a:rPr>
+              <a:t>Brand incorporation</a:t>
+            </a:r>
+            <a:r>
+              <a:rPr lang="en-US" baseline="0" dirty="0" smtClean="0">
+                <a:solidFill>
+                  <a:srgbClr val="122956"/>
+                </a:solidFill>
+                <a:latin typeface="Lucida Grande" charset="0"/>
+                <a:ea typeface="ＭＳ Ｐゴシック" charset="0"/>
+                <a:cs typeface="Lucida Grande" charset="0"/>
+                <a:sym typeface="Lucida Grande" charset="0"/>
+              </a:rPr>
+              <a:t> needs to start at some of the most fundamental levels. The app icon and default screens are the easiest ones to attack. Once you understand the brand, focus the UI on the core message to the consumer. Your app icon is the very first piece of art that people will judge your app on. Design it wisely and make sure that it flows with your app appropriately.</a:t>
+            </a:r>
+          </a:p>
+          <a:p>
+            <a:pPr marL="420688" indent="-341313" eaLnBrk="1" hangingPunct="1">
+              <a:spcBef>
+                <a:spcPts val="600"/>
+              </a:spcBef>
+              <a:tabLst>
+                <a:tab pos="114300" algn="l"/>
+                <a:tab pos="990600" algn="l"/>
+                <a:tab pos="1905000" algn="l"/>
+                <a:tab pos="2819400" algn="l"/>
+                <a:tab pos="3733800" algn="l"/>
+                <a:tab pos="4648200" algn="l"/>
+                <a:tab pos="5562600" algn="l"/>
+              </a:tabLst>
+            </a:pPr>
+            <a:endParaRPr lang="en-US" baseline="0" dirty="0" smtClean="0">
+              <a:solidFill>
+                <a:srgbClr val="122956"/>
+              </a:solidFill>
+              <a:latin typeface="Lucida Grande" charset="0"/>
+              <a:ea typeface="ＭＳ Ｐゴシック" charset="0"/>
+              <a:cs typeface="Lucida Grande" charset="0"/>
+              <a:sym typeface="Lucida Grande" charset="0"/>
+            </a:endParaRPr>
+          </a:p>
+          <a:p>
+            <a:pPr marL="420688" indent="-341313" eaLnBrk="1" hangingPunct="1">
+              <a:spcBef>
+                <a:spcPts val="600"/>
+              </a:spcBef>
+              <a:tabLst>
+                <a:tab pos="114300" algn="l"/>
+                <a:tab pos="990600" algn="l"/>
+                <a:tab pos="1905000" algn="l"/>
+                <a:tab pos="2819400" algn="l"/>
+                <a:tab pos="3733800" algn="l"/>
+                <a:tab pos="4648200" algn="l"/>
+                <a:tab pos="5562600" algn="l"/>
+              </a:tabLst>
+            </a:pPr>
+            <a:r>
+              <a:rPr lang="en-US" baseline="0" dirty="0" smtClean="0">
+                <a:solidFill>
+                  <a:srgbClr val="122956"/>
+                </a:solidFill>
+                <a:latin typeface="Lucida Grande" charset="0"/>
+                <a:ea typeface="ＭＳ Ｐゴシック" charset="0"/>
+                <a:cs typeface="Lucida Grande" charset="0"/>
+                <a:sym typeface="Lucida Grande" charset="0"/>
+              </a:rPr>
+              <a:t>As mentioned in the last module, make sure that your brand colors flow in the appropriate areas through your application. If you determine all headers are to be white, make sure that you are consistent. This is deciding brand rules for your application design. Designers often don’t think of apps as interactive pieces all the time so if you see variances in the artwork make sure to ask “why”. It is very important for the designer to describe every pixel on the screen.</a:t>
+            </a:r>
+          </a:p>
+          <a:p>
+            <a:pPr marL="420688" indent="-341313" eaLnBrk="1" hangingPunct="1">
+              <a:spcBef>
+                <a:spcPts val="600"/>
+              </a:spcBef>
+              <a:tabLst>
+                <a:tab pos="114300" algn="l"/>
+                <a:tab pos="990600" algn="l"/>
+                <a:tab pos="1905000" algn="l"/>
+                <a:tab pos="2819400" algn="l"/>
+                <a:tab pos="3733800" algn="l"/>
+                <a:tab pos="4648200" algn="l"/>
+                <a:tab pos="5562600" algn="l"/>
+              </a:tabLst>
+            </a:pPr>
+            <a:endParaRPr lang="en-US" baseline="0" dirty="0" smtClean="0">
+              <a:solidFill>
+                <a:srgbClr val="122956"/>
+              </a:solidFill>
+              <a:latin typeface="Lucida Grande" charset="0"/>
+              <a:ea typeface="ＭＳ Ｐゴシック" charset="0"/>
+              <a:cs typeface="Lucida Grande" charset="0"/>
+              <a:sym typeface="Lucida Grande" charset="0"/>
+            </a:endParaRPr>
+          </a:p>
+          <a:p>
+            <a:pPr marL="420688" indent="-341313" eaLnBrk="1" hangingPunct="1">
+              <a:spcBef>
+                <a:spcPts val="600"/>
+              </a:spcBef>
+              <a:tabLst>
+                <a:tab pos="114300" algn="l"/>
+                <a:tab pos="990600" algn="l"/>
+                <a:tab pos="1905000" algn="l"/>
+                <a:tab pos="2819400" algn="l"/>
+                <a:tab pos="3733800" algn="l"/>
+                <a:tab pos="4648200" algn="l"/>
+                <a:tab pos="5562600" algn="l"/>
+              </a:tabLst>
+            </a:pPr>
+            <a:r>
+              <a:rPr lang="en-US" baseline="0" dirty="0" smtClean="0">
+                <a:solidFill>
+                  <a:srgbClr val="122956"/>
+                </a:solidFill>
+                <a:latin typeface="Lucida Grande" charset="0"/>
+                <a:ea typeface="ＭＳ Ｐゴシック" charset="0"/>
+                <a:cs typeface="Lucida Grande" charset="0"/>
+                <a:sym typeface="Lucida Grande" charset="0"/>
+              </a:rPr>
+              <a:t>UI components are also very easy to modify if you have the assets available. Make you that you use consistent colors and designs throughout your application that accurately represent what they are.</a:t>
+            </a:r>
             <a:endParaRPr lang="en-US" dirty="0">
               <a:solidFill>
                 <a:srgbClr val="122956"/>
@@ -2040,6 +2453,199 @@
                 <a:tab pos="5562600" algn="l"/>
               </a:tabLst>
             </a:pPr>
+            <a:r>
+              <a:rPr lang="en-US" dirty="0" smtClean="0">
+                <a:solidFill>
+                  <a:srgbClr val="122956"/>
+                </a:solidFill>
+                <a:latin typeface="Lucida Grande" charset="0"/>
+                <a:ea typeface="ＭＳ Ｐゴシック" charset="0"/>
+                <a:cs typeface="Lucida Grande" charset="0"/>
+                <a:sym typeface="Lucida Grande" charset="0"/>
+              </a:rPr>
+              <a:t>Custom fonts are one</a:t>
+            </a:r>
+            <a:r>
+              <a:rPr lang="en-US" baseline="0" dirty="0" smtClean="0">
+                <a:solidFill>
+                  <a:srgbClr val="122956"/>
+                </a:solidFill>
+                <a:latin typeface="Lucida Grande" charset="0"/>
+                <a:ea typeface="ＭＳ Ｐゴシック" charset="0"/>
+                <a:cs typeface="Lucida Grande" charset="0"/>
+                <a:sym typeface="Lucida Grande" charset="0"/>
+              </a:rPr>
+              <a:t> of the easiest items to improve upon in any application. Make sure that you cross reference the list of available fonts on device before actually including them in your app. There is no reason to have unnecessary overhead. Adding custom fonts will also allow you to identify areas where images are not necessarily needed.</a:t>
+            </a:r>
+          </a:p>
+          <a:p>
+            <a:pPr marL="420688" indent="-341313" eaLnBrk="1" hangingPunct="1">
+              <a:spcBef>
+                <a:spcPts val="600"/>
+              </a:spcBef>
+              <a:tabLst>
+                <a:tab pos="114300" algn="l"/>
+                <a:tab pos="990600" algn="l"/>
+                <a:tab pos="1905000" algn="l"/>
+                <a:tab pos="2819400" algn="l"/>
+                <a:tab pos="3733800" algn="l"/>
+                <a:tab pos="4648200" algn="l"/>
+                <a:tab pos="5562600" algn="l"/>
+              </a:tabLst>
+            </a:pPr>
+            <a:endParaRPr lang="en-US" baseline="0" dirty="0" smtClean="0">
+              <a:solidFill>
+                <a:srgbClr val="122956"/>
+              </a:solidFill>
+              <a:latin typeface="Lucida Grande" charset="0"/>
+              <a:ea typeface="ＭＳ Ｐゴシック" charset="0"/>
+              <a:cs typeface="Lucida Grande" charset="0"/>
+              <a:sym typeface="Lucida Grande" charset="0"/>
+            </a:endParaRPr>
+          </a:p>
+          <a:p>
+            <a:pPr marL="420688" indent="-341313" eaLnBrk="1" hangingPunct="1">
+              <a:spcBef>
+                <a:spcPts val="600"/>
+              </a:spcBef>
+              <a:buFontTx/>
+              <a:buChar char="-"/>
+              <a:tabLst>
+                <a:tab pos="114300" algn="l"/>
+                <a:tab pos="990600" algn="l"/>
+                <a:tab pos="1905000" algn="l"/>
+                <a:tab pos="2819400" algn="l"/>
+                <a:tab pos="3733800" algn="l"/>
+                <a:tab pos="4648200" algn="l"/>
+                <a:tab pos="5562600" algn="l"/>
+              </a:tabLst>
+            </a:pPr>
+            <a:r>
+              <a:rPr lang="en-US" baseline="0" dirty="0" smtClean="0">
+                <a:solidFill>
+                  <a:srgbClr val="122956"/>
+                </a:solidFill>
+                <a:latin typeface="Lucida Grande" charset="0"/>
+                <a:ea typeface="ＭＳ Ｐゴシック" charset="0"/>
+                <a:cs typeface="Lucida Grande" charset="0"/>
+                <a:sym typeface="Lucida Grande" charset="0"/>
+              </a:rPr>
+              <a:t>Ensure that you don’t overuse custom fonts in the application. Script fonts are nice, but not everywhere. Use them in key areas of your application that need the added brand message.</a:t>
+            </a:r>
+          </a:p>
+          <a:p>
+            <a:pPr marL="420688" indent="-341313" eaLnBrk="1" hangingPunct="1">
+              <a:spcBef>
+                <a:spcPts val="600"/>
+              </a:spcBef>
+              <a:buFontTx/>
+              <a:buChar char="-"/>
+              <a:tabLst>
+                <a:tab pos="114300" algn="l"/>
+                <a:tab pos="990600" algn="l"/>
+                <a:tab pos="1905000" algn="l"/>
+                <a:tab pos="2819400" algn="l"/>
+                <a:tab pos="3733800" algn="l"/>
+                <a:tab pos="4648200" algn="l"/>
+                <a:tab pos="5562600" algn="l"/>
+              </a:tabLst>
+            </a:pPr>
+            <a:endParaRPr lang="en-US" baseline="0" dirty="0" smtClean="0">
+              <a:solidFill>
+                <a:srgbClr val="122956"/>
+              </a:solidFill>
+              <a:latin typeface="Lucida Grande" charset="0"/>
+              <a:ea typeface="ＭＳ Ｐゴシック" charset="0"/>
+              <a:cs typeface="Lucida Grande" charset="0"/>
+              <a:sym typeface="Lucida Grande" charset="0"/>
+            </a:endParaRPr>
+          </a:p>
+          <a:p>
+            <a:pPr marL="420688" indent="-341313" eaLnBrk="1" hangingPunct="1">
+              <a:spcBef>
+                <a:spcPts val="600"/>
+              </a:spcBef>
+              <a:buFontTx/>
+              <a:buChar char="-"/>
+              <a:tabLst>
+                <a:tab pos="114300" algn="l"/>
+                <a:tab pos="990600" algn="l"/>
+                <a:tab pos="1905000" algn="l"/>
+                <a:tab pos="2819400" algn="l"/>
+                <a:tab pos="3733800" algn="l"/>
+                <a:tab pos="4648200" algn="l"/>
+                <a:tab pos="5562600" algn="l"/>
+              </a:tabLst>
+            </a:pPr>
+            <a:r>
+              <a:rPr lang="en-US" baseline="0" dirty="0" smtClean="0">
+                <a:solidFill>
+                  <a:srgbClr val="122956"/>
+                </a:solidFill>
+                <a:latin typeface="Lucida Grande" charset="0"/>
+                <a:ea typeface="ＭＳ Ｐゴシック" charset="0"/>
+                <a:cs typeface="Lucida Grande" charset="0"/>
+                <a:sym typeface="Lucida Grande" charset="0"/>
+              </a:rPr>
+              <a:t>This means using them where appropriate in your application. If this isn’t defined in your brand document, write down where and how your using the custom fonts. The more you define the details of usage the better.</a:t>
+            </a:r>
+          </a:p>
+          <a:p>
+            <a:pPr marL="420688" indent="-341313" eaLnBrk="1" hangingPunct="1">
+              <a:spcBef>
+                <a:spcPts val="600"/>
+              </a:spcBef>
+              <a:buFontTx/>
+              <a:buChar char="-"/>
+              <a:tabLst>
+                <a:tab pos="114300" algn="l"/>
+                <a:tab pos="990600" algn="l"/>
+                <a:tab pos="1905000" algn="l"/>
+                <a:tab pos="2819400" algn="l"/>
+                <a:tab pos="3733800" algn="l"/>
+                <a:tab pos="4648200" algn="l"/>
+                <a:tab pos="5562600" algn="l"/>
+              </a:tabLst>
+            </a:pPr>
+            <a:endParaRPr lang="en-US" baseline="0" dirty="0" smtClean="0">
+              <a:solidFill>
+                <a:srgbClr val="122956"/>
+              </a:solidFill>
+              <a:latin typeface="Lucida Grande" charset="0"/>
+              <a:ea typeface="ＭＳ Ｐゴシック" charset="0"/>
+              <a:cs typeface="Lucida Grande" charset="0"/>
+              <a:sym typeface="Lucida Grande" charset="0"/>
+            </a:endParaRPr>
+          </a:p>
+          <a:p>
+            <a:pPr marL="420688" indent="-341313" eaLnBrk="1" hangingPunct="1">
+              <a:spcBef>
+                <a:spcPts val="600"/>
+              </a:spcBef>
+              <a:buFontTx/>
+              <a:buChar char="-"/>
+              <a:tabLst>
+                <a:tab pos="114300" algn="l"/>
+                <a:tab pos="990600" algn="l"/>
+                <a:tab pos="1905000" algn="l"/>
+                <a:tab pos="2819400" algn="l"/>
+                <a:tab pos="3733800" algn="l"/>
+                <a:tab pos="4648200" algn="l"/>
+                <a:tab pos="5562600" algn="l"/>
+              </a:tabLst>
+            </a:pPr>
+            <a:r>
+              <a:rPr lang="en-US" baseline="0" dirty="0" smtClean="0">
+                <a:solidFill>
+                  <a:srgbClr val="122956"/>
+                </a:solidFill>
+                <a:latin typeface="Lucida Grande" charset="0"/>
+                <a:ea typeface="ＭＳ Ｐゴシック" charset="0"/>
+                <a:cs typeface="Lucida Grande" charset="0"/>
+                <a:sym typeface="Lucida Grande" charset="0"/>
+              </a:rPr>
+              <a:t>This means adhering to your brand. The more you define the details of your brand, the better.</a:t>
+            </a:r>
             <a:endParaRPr lang="en-US" dirty="0">
               <a:solidFill>
                 <a:srgbClr val="122956"/>
@@ -2136,6 +2742,30 @@
                 <a:spcPts val="450"/>
               </a:spcBef>
             </a:pPr>
+            <a:r>
+              <a:rPr lang="en-US" dirty="0" smtClean="0">
+                <a:solidFill>
+                  <a:srgbClr val="000000"/>
+                </a:solidFill>
+                <a:latin typeface="Times New Roman" charset="0"/>
+                <a:ea typeface="ＭＳ Ｐゴシック" charset="0"/>
+                <a:cs typeface="Times New Roman" charset="0"/>
+                <a:sym typeface="Times New Roman" charset="0"/>
+              </a:rPr>
+              <a:t>With that being said, let’s dive</a:t>
+            </a:r>
+            <a:r>
+              <a:rPr lang="en-US" baseline="0" dirty="0" smtClean="0">
+                <a:solidFill>
+                  <a:srgbClr val="000000"/>
+                </a:solidFill>
+                <a:latin typeface="Times New Roman" charset="0"/>
+                <a:ea typeface="ＭＳ Ｐゴシック" charset="0"/>
+                <a:cs typeface="Times New Roman" charset="0"/>
+                <a:sym typeface="Times New Roman" charset="0"/>
+              </a:rPr>
+              <a:t> into a custom navigation example and how we can improve upon the apps infrastructure and UI.</a:t>
+            </a:r>
             <a:endParaRPr lang="en-US" dirty="0">
               <a:solidFill>
                 <a:srgbClr val="000000"/>
@@ -2241,6 +2871,148 @@
                 <a:tab pos="5562600" algn="l"/>
               </a:tabLst>
             </a:pPr>
+            <a:r>
+              <a:rPr lang="en-US" dirty="0" smtClean="0">
+                <a:solidFill>
+                  <a:srgbClr val="122956"/>
+                </a:solidFill>
+                <a:latin typeface="Lucida Grande" charset="0"/>
+                <a:ea typeface="ＭＳ Ｐゴシック" charset="0"/>
+                <a:cs typeface="Lucida Grande" charset="0"/>
+                <a:sym typeface="Lucida Grande" charset="0"/>
+              </a:rPr>
+              <a:t>Simply put common</a:t>
+            </a:r>
+            <a:r>
+              <a:rPr lang="en-US" baseline="0" dirty="0" smtClean="0">
+                <a:solidFill>
+                  <a:srgbClr val="122956"/>
+                </a:solidFill>
+                <a:latin typeface="Lucida Grande" charset="0"/>
+                <a:ea typeface="ＭＳ Ｐゴシック" charset="0"/>
+                <a:cs typeface="Lucida Grande" charset="0"/>
+                <a:sym typeface="Lucida Grande" charset="0"/>
+              </a:rPr>
+              <a:t> components are very boring. A simple tab bar looks the same in every application. Same goes for the default title control. Sure you can change color, but believe it or now, most don’t spend the time to do so.</a:t>
+            </a:r>
+          </a:p>
+          <a:p>
+            <a:pPr marL="420688" indent="-341313" eaLnBrk="1" hangingPunct="1">
+              <a:spcBef>
+                <a:spcPts val="600"/>
+              </a:spcBef>
+              <a:tabLst>
+                <a:tab pos="114300" algn="l"/>
+                <a:tab pos="990600" algn="l"/>
+                <a:tab pos="1905000" algn="l"/>
+                <a:tab pos="2819400" algn="l"/>
+                <a:tab pos="3733800" algn="l"/>
+                <a:tab pos="4648200" algn="l"/>
+                <a:tab pos="5562600" algn="l"/>
+              </a:tabLst>
+            </a:pPr>
+            <a:endParaRPr lang="en-US" baseline="0" dirty="0" smtClean="0">
+              <a:solidFill>
+                <a:srgbClr val="122956"/>
+              </a:solidFill>
+              <a:latin typeface="Lucida Grande" charset="0"/>
+              <a:ea typeface="ＭＳ Ｐゴシック" charset="0"/>
+              <a:cs typeface="Lucida Grande" charset="0"/>
+              <a:sym typeface="Lucida Grande" charset="0"/>
+            </a:endParaRPr>
+          </a:p>
+          <a:p>
+            <a:pPr marL="420688" indent="-341313" eaLnBrk="1" hangingPunct="1">
+              <a:spcBef>
+                <a:spcPts val="600"/>
+              </a:spcBef>
+              <a:tabLst>
+                <a:tab pos="114300" algn="l"/>
+                <a:tab pos="990600" algn="l"/>
+                <a:tab pos="1905000" algn="l"/>
+                <a:tab pos="2819400" algn="l"/>
+                <a:tab pos="3733800" algn="l"/>
+                <a:tab pos="4648200" algn="l"/>
+                <a:tab pos="5562600" algn="l"/>
+              </a:tabLst>
+            </a:pPr>
+            <a:r>
+              <a:rPr lang="en-US" baseline="0" dirty="0" smtClean="0">
+                <a:solidFill>
+                  <a:srgbClr val="122956"/>
+                </a:solidFill>
+                <a:latin typeface="Lucida Grande" charset="0"/>
+                <a:ea typeface="ＭＳ Ｐゴシック" charset="0"/>
+                <a:cs typeface="Lucida Grande" charset="0"/>
+                <a:sym typeface="Lucida Grande" charset="0"/>
+              </a:rPr>
+              <a:t>This leads us to what is not by default branded in your application and this is the tab bar and title control. By owing these two items that are consistent across most of your app, you can drastically change the appeal, emotion, and style of your final application.</a:t>
+            </a:r>
+          </a:p>
+          <a:p>
+            <a:pPr marL="420688" indent="-341313" eaLnBrk="1" hangingPunct="1">
+              <a:spcBef>
+                <a:spcPts val="600"/>
+              </a:spcBef>
+              <a:tabLst>
+                <a:tab pos="114300" algn="l"/>
+                <a:tab pos="990600" algn="l"/>
+                <a:tab pos="1905000" algn="l"/>
+                <a:tab pos="2819400" algn="l"/>
+                <a:tab pos="3733800" algn="l"/>
+                <a:tab pos="4648200" algn="l"/>
+                <a:tab pos="5562600" algn="l"/>
+              </a:tabLst>
+            </a:pPr>
+            <a:endParaRPr lang="en-US" baseline="0" dirty="0" smtClean="0">
+              <a:solidFill>
+                <a:srgbClr val="122956"/>
+              </a:solidFill>
+              <a:latin typeface="Lucida Grande" charset="0"/>
+              <a:ea typeface="ＭＳ Ｐゴシック" charset="0"/>
+              <a:cs typeface="Lucida Grande" charset="0"/>
+              <a:sym typeface="Lucida Grande" charset="0"/>
+            </a:endParaRPr>
+          </a:p>
+          <a:p>
+            <a:pPr marL="420688" indent="-341313" eaLnBrk="1" hangingPunct="1">
+              <a:spcBef>
+                <a:spcPts val="600"/>
+              </a:spcBef>
+              <a:tabLst>
+                <a:tab pos="114300" algn="l"/>
+                <a:tab pos="990600" algn="l"/>
+                <a:tab pos="1905000" algn="l"/>
+                <a:tab pos="2819400" algn="l"/>
+                <a:tab pos="3733800" algn="l"/>
+                <a:tab pos="4648200" algn="l"/>
+                <a:tab pos="5562600" algn="l"/>
+              </a:tabLst>
+            </a:pPr>
+            <a:r>
+              <a:rPr lang="en-US" baseline="0" dirty="0" smtClean="0">
+                <a:solidFill>
+                  <a:srgbClr val="122956"/>
+                </a:solidFill>
+                <a:latin typeface="Lucida Grande" charset="0"/>
+                <a:ea typeface="ＭＳ Ｐゴシック" charset="0"/>
+                <a:cs typeface="Lucida Grande" charset="0"/>
+                <a:sym typeface="Lucida Grande" charset="0"/>
+              </a:rPr>
+              <a:t>We’ll focus specifically on the title and </a:t>
+            </a:r>
+            <a:r>
+              <a:rPr lang="en-US" baseline="0" smtClean="0">
+                <a:solidFill>
+                  <a:srgbClr val="122956"/>
+                </a:solidFill>
+                <a:latin typeface="Lucida Grande" charset="0"/>
+                <a:ea typeface="ＭＳ Ｐゴシック" charset="0"/>
+                <a:cs typeface="Lucida Grande" charset="0"/>
+                <a:sym typeface="Lucida Grande" charset="0"/>
+              </a:rPr>
+              <a:t>tab bar.</a:t>
+            </a:r>
             <a:endParaRPr lang="en-US" dirty="0">
               <a:solidFill>
                 <a:srgbClr val="122956"/>
@@ -6777,65 +7549,6 @@
           </a:extLst>
         </p:spPr>
       </p:pic>
-      <p:sp>
-        <p:nvSpPr>
-          <p:cNvPr id="18434" name="Rectangle 2"/>
-          <p:cNvSpPr>
-            <a:spLocks/>
-          </p:cNvSpPr>
-          <p:nvPr/>
-        </p:nvSpPr>
-        <p:spPr bwMode="auto">
-          <a:xfrm>
-            <a:off x="3124200" y="6696075"/>
-            <a:ext cx="2921000" cy="127000"/>
-          </a:xfrm>
-          <a:prstGeom prst="rect">
-            <a:avLst/>
-          </a:prstGeom>
-          <a:noFill/>
-          <a:ln>
-            <a:noFill/>
-          </a:ln>
-          <a:extLst>
-            <a:ext uri="{909E8E84-426E-40dd-AFC4-6F175D3DCCD1}">
-              <a14:hiddenFill xmlns:a14="http://schemas.microsoft.com/office/drawing/2010/main">
-                <a:solidFill>
-                  <a:srgbClr val="FFFFFF"/>
-                </a:solidFill>
-              </a14:hiddenFill>
-            </a:ext>
-            <a:ext uri="{91240B29-F687-4f45-9708-019B960494DF}">
-              <a14:hiddenLine xmlns:a14="http://schemas.microsoft.com/office/drawing/2010/main" w="9525">
-                <a:solidFill>
-                  <a:srgbClr val="000000"/>
-                </a:solidFill>
-                <a:miter lim="800000"/>
-                <a:headEnd/>
-                <a:tailEnd/>
-              </a14:hiddenLine>
-            </a:ext>
-          </a:extLst>
-        </p:spPr>
-        <p:txBody>
-          <a:bodyPr lIns="0" tIns="0" rIns="40639" bIns="0" anchor="ctr"/>
-          <a:lstStyle/>
-          <a:p>
-            <a:pPr marL="39688" algn="ctr"/>
-            <a:r>
-              <a:rPr lang="en-US" sz="800">
-                <a:solidFill>
-                  <a:srgbClr val="ACB8C0"/>
-                </a:solidFill>
-                <a:latin typeface="Helvetica" charset="0"/>
-                <a:cs typeface="Helvetica" charset="0"/>
-                <a:sym typeface="Helvetica" charset="0"/>
-              </a:rPr>
-              <a:t>© 2011 Appcelerator, Inc.</a:t>
-            </a:r>
-          </a:p>
-        </p:txBody>
-      </p:sp>
       <p:pic>
         <p:nvPicPr>
           <p:cNvPr id="18435" name="Picture 3"/>
@@ -6946,65 +7659,6 @@
       </p:pic>
       <p:sp>
         <p:nvSpPr>
-          <p:cNvPr id="18437" name="Rectangle 5"/>
-          <p:cNvSpPr>
-            <a:spLocks/>
-          </p:cNvSpPr>
-          <p:nvPr/>
-        </p:nvSpPr>
-        <p:spPr bwMode="auto">
-          <a:xfrm>
-            <a:off x="3124200" y="6696075"/>
-            <a:ext cx="2921000" cy="127000"/>
-          </a:xfrm>
-          <a:prstGeom prst="rect">
-            <a:avLst/>
-          </a:prstGeom>
-          <a:noFill/>
-          <a:ln>
-            <a:noFill/>
-          </a:ln>
-          <a:extLst>
-            <a:ext uri="{909E8E84-426E-40dd-AFC4-6F175D3DCCD1}">
-              <a14:hiddenFill xmlns:a14="http://schemas.microsoft.com/office/drawing/2010/main">
-                <a:solidFill>
-                  <a:srgbClr val="FFFFFF"/>
-                </a:solidFill>
-              </a14:hiddenFill>
-            </a:ext>
-            <a:ext uri="{91240B29-F687-4f45-9708-019B960494DF}">
-              <a14:hiddenLine xmlns:a14="http://schemas.microsoft.com/office/drawing/2010/main" w="9525">
-                <a:solidFill>
-                  <a:srgbClr val="000000"/>
-                </a:solidFill>
-                <a:miter lim="800000"/>
-                <a:headEnd/>
-                <a:tailEnd/>
-              </a14:hiddenLine>
-            </a:ext>
-          </a:extLst>
-        </p:spPr>
-        <p:txBody>
-          <a:bodyPr lIns="0" tIns="0" rIns="40639" bIns="0" anchor="ctr"/>
-          <a:lstStyle/>
-          <a:p>
-            <a:pPr marL="39688" algn="ctr"/>
-            <a:r>
-              <a:rPr lang="en-US" sz="800">
-                <a:solidFill>
-                  <a:srgbClr val="ACB8C0"/>
-                </a:solidFill>
-                <a:latin typeface="Helvetica" charset="0"/>
-                <a:cs typeface="Helvetica" charset="0"/>
-                <a:sym typeface="Helvetica" charset="0"/>
-              </a:rPr>
-              <a:t>© 2011 Appcelerator, Inc.</a:t>
-            </a:r>
-          </a:p>
-        </p:txBody>
-      </p:sp>
-      <p:sp>
-        <p:nvSpPr>
           <p:cNvPr id="18438" name="Rectangle 6"/>
           <p:cNvSpPr>
             <a:spLocks noGrp="1" noChangeArrowheads="1"/>
@@ -7036,6 +7690,81 @@
               <a:latin typeface="Trebuchet MS Bold" charset="0"/>
               <a:ea typeface="ヒラギノ角ゴ ProN W6" charset="0"/>
               <a:cs typeface="ヒラギノ角ゴ ProN W6" charset="0"/>
+            </a:endParaRPr>
+          </a:p>
+        </p:txBody>
+      </p:sp>
+      <p:sp>
+        <p:nvSpPr>
+          <p:cNvPr id="8" name="Rectangle 7"/>
+          <p:cNvSpPr>
+            <a:spLocks noGrp="1" noChangeArrowheads="1"/>
+          </p:cNvSpPr>
+          <p:nvPr>
+            <p:ph idx="1"/>
+          </p:nvPr>
+        </p:nvSpPr>
+        <p:spPr>
+          <a:xfrm>
+            <a:off x="152400" y="1346200"/>
+            <a:ext cx="8229600" cy="5359400"/>
+          </a:xfrm>
+        </p:spPr>
+        <p:txBody>
+          <a:bodyPr rIns="81279"/>
+          <a:lstStyle/>
+          <a:p>
+            <a:pPr indent="0" eaLnBrk="1" hangingPunct="1"/>
+            <a:r>
+              <a:rPr lang="en-US" dirty="0" smtClean="0">
+                <a:latin typeface="Trebuchet MS" charset="0"/>
+                <a:ea typeface="ヒラギノ角ゴ ProN W3" charset="0"/>
+                <a:cs typeface="ヒラギノ角ゴ ProN W3" charset="0"/>
+              </a:rPr>
+              <a:t>Design In advance</a:t>
+            </a:r>
+          </a:p>
+          <a:p>
+            <a:pPr indent="0" eaLnBrk="1" hangingPunct="1"/>
+            <a:endParaRPr lang="en-US" dirty="0">
+              <a:latin typeface="Trebuchet MS" charset="0"/>
+              <a:ea typeface="ヒラギノ角ゴ ProN W3" charset="0"/>
+              <a:cs typeface="ヒラギノ角ゴ ProN W3" charset="0"/>
+            </a:endParaRPr>
+          </a:p>
+          <a:p>
+            <a:pPr indent="0" eaLnBrk="1" hangingPunct="1"/>
+            <a:r>
+              <a:rPr lang="en-US" dirty="0" smtClean="0">
+                <a:latin typeface="Trebuchet MS" charset="0"/>
+                <a:ea typeface="ヒラギノ角ゴ ProN W3" charset="0"/>
+                <a:cs typeface="ヒラギノ角ゴ ProN W3" charset="0"/>
+              </a:rPr>
+              <a:t>Develop reusable assets</a:t>
+            </a:r>
+          </a:p>
+          <a:p>
+            <a:pPr indent="0" eaLnBrk="1" hangingPunct="1"/>
+            <a:endParaRPr lang="en-US" dirty="0" smtClean="0">
+              <a:latin typeface="Trebuchet MS" charset="0"/>
+              <a:ea typeface="ヒラギノ角ゴ ProN W3" charset="0"/>
+              <a:cs typeface="ヒラギノ角ゴ ProN W3" charset="0"/>
+            </a:endParaRPr>
+          </a:p>
+          <a:p>
+            <a:pPr indent="0" eaLnBrk="1" hangingPunct="1"/>
+            <a:endParaRPr lang="en-US" dirty="0">
+              <a:latin typeface="Trebuchet MS" charset="0"/>
+              <a:ea typeface="ヒラギノ角ゴ ProN W3" charset="0"/>
+              <a:cs typeface="ヒラギノ角ゴ ProN W3" charset="0"/>
+            </a:endParaRPr>
+          </a:p>
+          <a:p>
+            <a:pPr indent="0" eaLnBrk="1" hangingPunct="1"/>
+            <a:endParaRPr lang="en-US" dirty="0">
+              <a:latin typeface="Trebuchet MS" charset="0"/>
+              <a:ea typeface="ヒラギノ角ゴ ProN W3" charset="0"/>
+              <a:cs typeface="ヒラギノ角ゴ ProN W3" charset="0"/>
             </a:endParaRPr>
           </a:p>
         </p:txBody>
@@ -7132,65 +7861,6 @@
           </a:extLst>
         </p:spPr>
       </p:pic>
-      <p:sp>
-        <p:nvSpPr>
-          <p:cNvPr id="18434" name="Rectangle 2"/>
-          <p:cNvSpPr>
-            <a:spLocks/>
-          </p:cNvSpPr>
-          <p:nvPr/>
-        </p:nvSpPr>
-        <p:spPr bwMode="auto">
-          <a:xfrm>
-            <a:off x="3124200" y="6696075"/>
-            <a:ext cx="2921000" cy="127000"/>
-          </a:xfrm>
-          <a:prstGeom prst="rect">
-            <a:avLst/>
-          </a:prstGeom>
-          <a:noFill/>
-          <a:ln>
-            <a:noFill/>
-          </a:ln>
-          <a:extLst>
-            <a:ext uri="{909E8E84-426E-40dd-AFC4-6F175D3DCCD1}">
-              <a14:hiddenFill xmlns:a14="http://schemas.microsoft.com/office/drawing/2010/main">
-                <a:solidFill>
-                  <a:srgbClr val="FFFFFF"/>
-                </a:solidFill>
-              </a14:hiddenFill>
-            </a:ext>
-            <a:ext uri="{91240B29-F687-4f45-9708-019B960494DF}">
-              <a14:hiddenLine xmlns:a14="http://schemas.microsoft.com/office/drawing/2010/main" w="9525">
-                <a:solidFill>
-                  <a:srgbClr val="000000"/>
-                </a:solidFill>
-                <a:miter lim="800000"/>
-                <a:headEnd/>
-                <a:tailEnd/>
-              </a14:hiddenLine>
-            </a:ext>
-          </a:extLst>
-        </p:spPr>
-        <p:txBody>
-          <a:bodyPr lIns="0" tIns="0" rIns="40639" bIns="0" anchor="ctr"/>
-          <a:lstStyle/>
-          <a:p>
-            <a:pPr marL="39688" algn="ctr"/>
-            <a:r>
-              <a:rPr lang="en-US" sz="800">
-                <a:solidFill>
-                  <a:srgbClr val="ACB8C0"/>
-                </a:solidFill>
-                <a:latin typeface="Helvetica" charset="0"/>
-                <a:cs typeface="Helvetica" charset="0"/>
-                <a:sym typeface="Helvetica" charset="0"/>
-              </a:rPr>
-              <a:t>© 2011 Appcelerator, Inc.</a:t>
-            </a:r>
-          </a:p>
-        </p:txBody>
-      </p:sp>
       <p:pic>
         <p:nvPicPr>
           <p:cNvPr id="18435" name="Picture 3"/>
@@ -7301,65 +7971,6 @@
       </p:pic>
       <p:sp>
         <p:nvSpPr>
-          <p:cNvPr id="18437" name="Rectangle 5"/>
-          <p:cNvSpPr>
-            <a:spLocks/>
-          </p:cNvSpPr>
-          <p:nvPr/>
-        </p:nvSpPr>
-        <p:spPr bwMode="auto">
-          <a:xfrm>
-            <a:off x="3124200" y="6696075"/>
-            <a:ext cx="2921000" cy="127000"/>
-          </a:xfrm>
-          <a:prstGeom prst="rect">
-            <a:avLst/>
-          </a:prstGeom>
-          <a:noFill/>
-          <a:ln>
-            <a:noFill/>
-          </a:ln>
-          <a:extLst>
-            <a:ext uri="{909E8E84-426E-40dd-AFC4-6F175D3DCCD1}">
-              <a14:hiddenFill xmlns:a14="http://schemas.microsoft.com/office/drawing/2010/main">
-                <a:solidFill>
-                  <a:srgbClr val="FFFFFF"/>
-                </a:solidFill>
-              </a14:hiddenFill>
-            </a:ext>
-            <a:ext uri="{91240B29-F687-4f45-9708-019B960494DF}">
-              <a14:hiddenLine xmlns:a14="http://schemas.microsoft.com/office/drawing/2010/main" w="9525">
-                <a:solidFill>
-                  <a:srgbClr val="000000"/>
-                </a:solidFill>
-                <a:miter lim="800000"/>
-                <a:headEnd/>
-                <a:tailEnd/>
-              </a14:hiddenLine>
-            </a:ext>
-          </a:extLst>
-        </p:spPr>
-        <p:txBody>
-          <a:bodyPr lIns="0" tIns="0" rIns="40639" bIns="0" anchor="ctr"/>
-          <a:lstStyle/>
-          <a:p>
-            <a:pPr marL="39688" algn="ctr"/>
-            <a:r>
-              <a:rPr lang="en-US" sz="800">
-                <a:solidFill>
-                  <a:srgbClr val="ACB8C0"/>
-                </a:solidFill>
-                <a:latin typeface="Helvetica" charset="0"/>
-                <a:cs typeface="Helvetica" charset="0"/>
-                <a:sym typeface="Helvetica" charset="0"/>
-              </a:rPr>
-              <a:t>© 2011 Appcelerator, Inc.</a:t>
-            </a:r>
-          </a:p>
-        </p:txBody>
-      </p:sp>
-      <p:sp>
-        <p:nvSpPr>
           <p:cNvPr id="18438" name="Rectangle 6"/>
           <p:cNvSpPr>
             <a:spLocks noGrp="1" noChangeArrowheads="1"/>
@@ -7391,6 +8002,62 @@
               <a:latin typeface="Trebuchet MS Bold" charset="0"/>
               <a:ea typeface="ヒラギノ角ゴ ProN W6" charset="0"/>
               <a:cs typeface="ヒラギノ角ゴ ProN W6" charset="0"/>
+            </a:endParaRPr>
+          </a:p>
+        </p:txBody>
+      </p:sp>
+      <p:sp>
+        <p:nvSpPr>
+          <p:cNvPr id="8" name="Rectangle 7"/>
+          <p:cNvSpPr>
+            <a:spLocks noGrp="1" noChangeArrowheads="1"/>
+          </p:cNvSpPr>
+          <p:nvPr>
+            <p:ph idx="1"/>
+          </p:nvPr>
+        </p:nvSpPr>
+        <p:spPr>
+          <a:xfrm>
+            <a:off x="152400" y="1346200"/>
+            <a:ext cx="8229600" cy="5359400"/>
+          </a:xfrm>
+        </p:spPr>
+        <p:txBody>
+          <a:bodyPr rIns="81279"/>
+          <a:lstStyle/>
+          <a:p>
+            <a:pPr indent="0" eaLnBrk="1" hangingPunct="1"/>
+            <a:r>
+              <a:rPr lang="en-US" dirty="0" smtClean="0">
+                <a:latin typeface="Trebuchet MS" charset="0"/>
+                <a:ea typeface="ヒラギノ角ゴ ProN W3" charset="0"/>
+                <a:cs typeface="ヒラギノ角ゴ ProN W3" charset="0"/>
+              </a:rPr>
+              <a:t>Best practices</a:t>
+            </a:r>
+          </a:p>
+          <a:p>
+            <a:pPr indent="0" eaLnBrk="1" hangingPunct="1"/>
+            <a:endParaRPr lang="en-US" dirty="0">
+              <a:latin typeface="Trebuchet MS" charset="0"/>
+              <a:ea typeface="ヒラギノ角ゴ ProN W3" charset="0"/>
+              <a:cs typeface="ヒラギノ角ゴ ProN W3" charset="0"/>
+            </a:endParaRPr>
+          </a:p>
+          <a:p>
+            <a:pPr indent="0" eaLnBrk="1" hangingPunct="1"/>
+            <a:r>
+              <a:rPr lang="en-US" dirty="0" smtClean="0">
+                <a:latin typeface="Trebuchet MS" charset="0"/>
+                <a:ea typeface="ヒラギノ角ゴ ProN W3" charset="0"/>
+                <a:cs typeface="ヒラギノ角ゴ ProN W3" charset="0"/>
+              </a:rPr>
+              <a:t>Why we leave the tab bar there</a:t>
+            </a:r>
+            <a:endParaRPr lang="en-US" dirty="0">
+              <a:latin typeface="Trebuchet MS" charset="0"/>
+              <a:ea typeface="ヒラギノ角ゴ ProN W3" charset="0"/>
+              <a:cs typeface="ヒラギノ角ゴ ProN W3" charset="0"/>
             </a:endParaRPr>
           </a:p>
         </p:txBody>
@@ -7487,65 +8154,6 @@
           </a:extLst>
         </p:spPr>
       </p:pic>
-      <p:sp>
-        <p:nvSpPr>
-          <p:cNvPr id="18434" name="Rectangle 2"/>
-          <p:cNvSpPr>
-            <a:spLocks/>
-          </p:cNvSpPr>
-          <p:nvPr/>
-        </p:nvSpPr>
-        <p:spPr bwMode="auto">
-          <a:xfrm>
-            <a:off x="3124200" y="6696075"/>
-            <a:ext cx="2921000" cy="127000"/>
-          </a:xfrm>
-          <a:prstGeom prst="rect">
-            <a:avLst/>
-          </a:prstGeom>
-          <a:noFill/>
-          <a:ln>
-            <a:noFill/>
-          </a:ln>
-          <a:extLst>
-            <a:ext uri="{909E8E84-426E-40dd-AFC4-6F175D3DCCD1}">
-              <a14:hiddenFill xmlns:a14="http://schemas.microsoft.com/office/drawing/2010/main">
-                <a:solidFill>
-                  <a:srgbClr val="FFFFFF"/>
-                </a:solidFill>
-              </a14:hiddenFill>
-            </a:ext>
-            <a:ext uri="{91240B29-F687-4f45-9708-019B960494DF}">
-              <a14:hiddenLine xmlns:a14="http://schemas.microsoft.com/office/drawing/2010/main" w="9525">
-                <a:solidFill>
-                  <a:srgbClr val="000000"/>
-                </a:solidFill>
-                <a:miter lim="800000"/>
-                <a:headEnd/>
-                <a:tailEnd/>
-              </a14:hiddenLine>
-            </a:ext>
-          </a:extLst>
-        </p:spPr>
-        <p:txBody>
-          <a:bodyPr lIns="0" tIns="0" rIns="40639" bIns="0" anchor="ctr"/>
-          <a:lstStyle/>
-          <a:p>
-            <a:pPr marL="39688" algn="ctr"/>
-            <a:r>
-              <a:rPr lang="en-US" sz="800">
-                <a:solidFill>
-                  <a:srgbClr val="ACB8C0"/>
-                </a:solidFill>
-                <a:latin typeface="Helvetica" charset="0"/>
-                <a:cs typeface="Helvetica" charset="0"/>
-                <a:sym typeface="Helvetica" charset="0"/>
-              </a:rPr>
-              <a:t>© 2011 Appcelerator, Inc.</a:t>
-            </a:r>
-          </a:p>
-        </p:txBody>
-      </p:sp>
       <p:pic>
         <p:nvPicPr>
           <p:cNvPr id="18435" name="Picture 3"/>
@@ -7656,65 +8264,6 @@
       </p:pic>
       <p:sp>
         <p:nvSpPr>
-          <p:cNvPr id="18437" name="Rectangle 5"/>
-          <p:cNvSpPr>
-            <a:spLocks/>
-          </p:cNvSpPr>
-          <p:nvPr/>
-        </p:nvSpPr>
-        <p:spPr bwMode="auto">
-          <a:xfrm>
-            <a:off x="3124200" y="6696075"/>
-            <a:ext cx="2921000" cy="127000"/>
-          </a:xfrm>
-          <a:prstGeom prst="rect">
-            <a:avLst/>
-          </a:prstGeom>
-          <a:noFill/>
-          <a:ln>
-            <a:noFill/>
-          </a:ln>
-          <a:extLst>
-            <a:ext uri="{909E8E84-426E-40dd-AFC4-6F175D3DCCD1}">
-              <a14:hiddenFill xmlns:a14="http://schemas.microsoft.com/office/drawing/2010/main">
-                <a:solidFill>
-                  <a:srgbClr val="FFFFFF"/>
-                </a:solidFill>
-              </a14:hiddenFill>
-            </a:ext>
-            <a:ext uri="{91240B29-F687-4f45-9708-019B960494DF}">
-              <a14:hiddenLine xmlns:a14="http://schemas.microsoft.com/office/drawing/2010/main" w="9525">
-                <a:solidFill>
-                  <a:srgbClr val="000000"/>
-                </a:solidFill>
-                <a:miter lim="800000"/>
-                <a:headEnd/>
-                <a:tailEnd/>
-              </a14:hiddenLine>
-            </a:ext>
-          </a:extLst>
-        </p:spPr>
-        <p:txBody>
-          <a:bodyPr lIns="0" tIns="0" rIns="40639" bIns="0" anchor="ctr"/>
-          <a:lstStyle/>
-          <a:p>
-            <a:pPr marL="39688" algn="ctr"/>
-            <a:r>
-              <a:rPr lang="en-US" sz="800">
-                <a:solidFill>
-                  <a:srgbClr val="ACB8C0"/>
-                </a:solidFill>
-                <a:latin typeface="Helvetica" charset="0"/>
-                <a:cs typeface="Helvetica" charset="0"/>
-                <a:sym typeface="Helvetica" charset="0"/>
-              </a:rPr>
-              <a:t>© 2011 Appcelerator, Inc.</a:t>
-            </a:r>
-          </a:p>
-        </p:txBody>
-      </p:sp>
-      <p:sp>
-        <p:nvSpPr>
           <p:cNvPr id="18438" name="Rectangle 6"/>
           <p:cNvSpPr>
             <a:spLocks noGrp="1" noChangeArrowheads="1"/>
@@ -7746,6 +8295,92 @@
               <a:latin typeface="Trebuchet MS Bold" charset="0"/>
               <a:ea typeface="ヒラギノ角ゴ ProN W6" charset="0"/>
               <a:cs typeface="ヒラギノ角ゴ ProN W6" charset="0"/>
+            </a:endParaRPr>
+          </a:p>
+        </p:txBody>
+      </p:sp>
+      <p:sp>
+        <p:nvSpPr>
+          <p:cNvPr id="8" name="Rectangle 7"/>
+          <p:cNvSpPr>
+            <a:spLocks noGrp="1" noChangeArrowheads="1"/>
+          </p:cNvSpPr>
+          <p:nvPr>
+            <p:ph idx="1"/>
+          </p:nvPr>
+        </p:nvSpPr>
+        <p:spPr>
+          <a:xfrm>
+            <a:off x="152400" y="1346200"/>
+            <a:ext cx="8229600" cy="5359400"/>
+          </a:xfrm>
+        </p:spPr>
+        <p:txBody>
+          <a:bodyPr rIns="81279"/>
+          <a:lstStyle/>
+          <a:p>
+            <a:pPr indent="0" eaLnBrk="1" hangingPunct="1"/>
+            <a:r>
+              <a:rPr lang="en-US" dirty="0" smtClean="0">
+                <a:latin typeface="Trebuchet MS" charset="0"/>
+                <a:ea typeface="ヒラギノ角ゴ ProN W3" charset="0"/>
+                <a:cs typeface="ヒラギノ角ゴ ProN W3" charset="0"/>
+              </a:rPr>
+              <a:t>How it all works together</a:t>
+            </a:r>
+          </a:p>
+          <a:p>
+            <a:pPr indent="0" eaLnBrk="1" hangingPunct="1"/>
+            <a:endParaRPr lang="en-US" dirty="0">
+              <a:latin typeface="Trebuchet MS" charset="0"/>
+              <a:ea typeface="ヒラギノ角ゴ ProN W3" charset="0"/>
+              <a:cs typeface="ヒラギノ角ゴ ProN W3" charset="0"/>
+            </a:endParaRPr>
+          </a:p>
+          <a:p>
+            <a:pPr indent="0" eaLnBrk="1" hangingPunct="1"/>
+            <a:r>
+              <a:rPr lang="en-US" dirty="0" smtClean="0">
+                <a:latin typeface="Trebuchet MS" charset="0"/>
+                <a:ea typeface="ヒラギノ角ゴ ProN W3" charset="0"/>
+                <a:cs typeface="ヒラギノ角ゴ ProN W3" charset="0"/>
+              </a:rPr>
+              <a:t>Why we do this extra work</a:t>
+            </a:r>
+          </a:p>
+          <a:p>
+            <a:pPr indent="0" eaLnBrk="1" hangingPunct="1"/>
+            <a:endParaRPr lang="en-US" dirty="0">
+              <a:latin typeface="Trebuchet MS" charset="0"/>
+              <a:ea typeface="ヒラギノ角ゴ ProN W3" charset="0"/>
+              <a:cs typeface="ヒラギノ角ゴ ProN W3" charset="0"/>
+            </a:endParaRPr>
+          </a:p>
+          <a:p>
+            <a:pPr indent="0" eaLnBrk="1" hangingPunct="1"/>
+            <a:r>
+              <a:rPr lang="en-US" dirty="0" smtClean="0">
+                <a:latin typeface="Trebuchet MS" charset="0"/>
+                <a:ea typeface="ヒラギノ角ゴ ProN W3" charset="0"/>
+                <a:cs typeface="ヒラギノ角ゴ ProN W3" charset="0"/>
+              </a:rPr>
+              <a:t>How to improve upon</a:t>
+            </a:r>
+          </a:p>
+          <a:p>
+            <a:pPr indent="0" eaLnBrk="1" hangingPunct="1"/>
+            <a:endParaRPr lang="en-US" dirty="0">
+              <a:latin typeface="Trebuchet MS" charset="0"/>
+              <a:ea typeface="ヒラギノ角ゴ ProN W3" charset="0"/>
+              <a:cs typeface="ヒラギノ角ゴ ProN W3" charset="0"/>
+            </a:endParaRPr>
+          </a:p>
+          <a:p>
+            <a:pPr indent="0" eaLnBrk="1" hangingPunct="1"/>
+            <a:endParaRPr lang="en-US" dirty="0">
+              <a:latin typeface="Trebuchet MS" charset="0"/>
+              <a:ea typeface="ヒラギノ角ゴ ProN W3" charset="0"/>
+              <a:cs typeface="ヒラギノ角ゴ ProN W3" charset="0"/>
             </a:endParaRPr>
           </a:p>
         </p:txBody>
@@ -7979,65 +8614,6 @@
           </a:extLst>
         </p:spPr>
       </p:pic>
-      <p:sp>
-        <p:nvSpPr>
-          <p:cNvPr id="18434" name="Rectangle 2"/>
-          <p:cNvSpPr>
-            <a:spLocks/>
-          </p:cNvSpPr>
-          <p:nvPr/>
-        </p:nvSpPr>
-        <p:spPr bwMode="auto">
-          <a:xfrm>
-            <a:off x="3124200" y="6696075"/>
-            <a:ext cx="2921000" cy="127000"/>
-          </a:xfrm>
-          <a:prstGeom prst="rect">
-            <a:avLst/>
-          </a:prstGeom>
-          <a:noFill/>
-          <a:ln>
-            <a:noFill/>
-          </a:ln>
-          <a:extLst>
-            <a:ext uri="{909E8E84-426E-40dd-AFC4-6F175D3DCCD1}">
-              <a14:hiddenFill xmlns:a14="http://schemas.microsoft.com/office/drawing/2010/main">
-                <a:solidFill>
-                  <a:srgbClr val="FFFFFF"/>
-                </a:solidFill>
-              </a14:hiddenFill>
-            </a:ext>
-            <a:ext uri="{91240B29-F687-4f45-9708-019B960494DF}">
-              <a14:hiddenLine xmlns:a14="http://schemas.microsoft.com/office/drawing/2010/main" w="9525">
-                <a:solidFill>
-                  <a:srgbClr val="000000"/>
-                </a:solidFill>
-                <a:miter lim="800000"/>
-                <a:headEnd/>
-                <a:tailEnd/>
-              </a14:hiddenLine>
-            </a:ext>
-          </a:extLst>
-        </p:spPr>
-        <p:txBody>
-          <a:bodyPr lIns="0" tIns="0" rIns="40639" bIns="0" anchor="ctr"/>
-          <a:lstStyle/>
-          <a:p>
-            <a:pPr marL="39688" algn="ctr"/>
-            <a:r>
-              <a:rPr lang="en-US" sz="800">
-                <a:solidFill>
-                  <a:srgbClr val="ACB8C0"/>
-                </a:solidFill>
-                <a:latin typeface="Helvetica" charset="0"/>
-                <a:cs typeface="Helvetica" charset="0"/>
-                <a:sym typeface="Helvetica" charset="0"/>
-              </a:rPr>
-              <a:t>© 2011 Appcelerator, Inc.</a:t>
-            </a:r>
-          </a:p>
-        </p:txBody>
-      </p:sp>
       <p:pic>
         <p:nvPicPr>
           <p:cNvPr id="18435" name="Picture 3"/>
@@ -8148,65 +8724,6 @@
       </p:pic>
       <p:sp>
         <p:nvSpPr>
-          <p:cNvPr id="18437" name="Rectangle 5"/>
-          <p:cNvSpPr>
-            <a:spLocks/>
-          </p:cNvSpPr>
-          <p:nvPr/>
-        </p:nvSpPr>
-        <p:spPr bwMode="auto">
-          <a:xfrm>
-            <a:off x="3124200" y="6696075"/>
-            <a:ext cx="2921000" cy="127000"/>
-          </a:xfrm>
-          <a:prstGeom prst="rect">
-            <a:avLst/>
-          </a:prstGeom>
-          <a:noFill/>
-          <a:ln>
-            <a:noFill/>
-          </a:ln>
-          <a:extLst>
-            <a:ext uri="{909E8E84-426E-40dd-AFC4-6F175D3DCCD1}">
-              <a14:hiddenFill xmlns:a14="http://schemas.microsoft.com/office/drawing/2010/main">
-                <a:solidFill>
-                  <a:srgbClr val="FFFFFF"/>
-                </a:solidFill>
-              </a14:hiddenFill>
-            </a:ext>
-            <a:ext uri="{91240B29-F687-4f45-9708-019B960494DF}">
-              <a14:hiddenLine xmlns:a14="http://schemas.microsoft.com/office/drawing/2010/main" w="9525">
-                <a:solidFill>
-                  <a:srgbClr val="000000"/>
-                </a:solidFill>
-                <a:miter lim="800000"/>
-                <a:headEnd/>
-                <a:tailEnd/>
-              </a14:hiddenLine>
-            </a:ext>
-          </a:extLst>
-        </p:spPr>
-        <p:txBody>
-          <a:bodyPr lIns="0" tIns="0" rIns="40639" bIns="0" anchor="ctr"/>
-          <a:lstStyle/>
-          <a:p>
-            <a:pPr marL="39688" algn="ctr"/>
-            <a:r>
-              <a:rPr lang="en-US" sz="800">
-                <a:solidFill>
-                  <a:srgbClr val="ACB8C0"/>
-                </a:solidFill>
-                <a:latin typeface="Helvetica" charset="0"/>
-                <a:cs typeface="Helvetica" charset="0"/>
-                <a:sym typeface="Helvetica" charset="0"/>
-              </a:rPr>
-              <a:t>© 2011 Appcelerator, Inc.</a:t>
-            </a:r>
-          </a:p>
-        </p:txBody>
-      </p:sp>
-      <p:sp>
-        <p:nvSpPr>
           <p:cNvPr id="18438" name="Rectangle 6"/>
           <p:cNvSpPr>
             <a:spLocks noGrp="1" noChangeArrowheads="1"/>
@@ -8238,6 +8755,92 @@
               <a:latin typeface="Trebuchet MS Bold" charset="0"/>
               <a:ea typeface="ヒラギノ角ゴ ProN W6" charset="0"/>
               <a:cs typeface="ヒラギノ角ゴ ProN W6" charset="0"/>
+            </a:endParaRPr>
+          </a:p>
+        </p:txBody>
+      </p:sp>
+      <p:sp>
+        <p:nvSpPr>
+          <p:cNvPr id="9" name="Rectangle 7"/>
+          <p:cNvSpPr>
+            <a:spLocks noGrp="1" noChangeArrowheads="1"/>
+          </p:cNvSpPr>
+          <p:nvPr>
+            <p:ph idx="1"/>
+          </p:nvPr>
+        </p:nvSpPr>
+        <p:spPr>
+          <a:xfrm>
+            <a:off x="152400" y="1346200"/>
+            <a:ext cx="8229600" cy="5359400"/>
+          </a:xfrm>
+        </p:spPr>
+        <p:txBody>
+          <a:bodyPr rIns="81279"/>
+          <a:lstStyle/>
+          <a:p>
+            <a:pPr indent="0" eaLnBrk="1" hangingPunct="1"/>
+            <a:r>
+              <a:rPr lang="en-US" dirty="0" smtClean="0">
+                <a:latin typeface="Trebuchet MS" charset="0"/>
+                <a:ea typeface="ヒラギノ角ゴ ProN W3" charset="0"/>
+                <a:cs typeface="ヒラギノ角ゴ ProN W3" charset="0"/>
+              </a:rPr>
+              <a:t>Titles can dictate other components</a:t>
+            </a:r>
+          </a:p>
+          <a:p>
+            <a:pPr indent="0" eaLnBrk="1" hangingPunct="1"/>
+            <a:endParaRPr lang="en-US" dirty="0">
+              <a:latin typeface="Trebuchet MS" charset="0"/>
+              <a:ea typeface="ヒラギノ角ゴ ProN W3" charset="0"/>
+              <a:cs typeface="ヒラギノ角ゴ ProN W3" charset="0"/>
+            </a:endParaRPr>
+          </a:p>
+          <a:p>
+            <a:pPr indent="0" eaLnBrk="1" hangingPunct="1"/>
+            <a:r>
+              <a:rPr lang="en-US" dirty="0" smtClean="0">
+                <a:latin typeface="Trebuchet MS" charset="0"/>
+                <a:ea typeface="ヒラギノ角ゴ ProN W3" charset="0"/>
+                <a:cs typeface="ヒラギノ角ゴ ProN W3" charset="0"/>
+              </a:rPr>
+              <a:t>Using titles per screen</a:t>
+            </a:r>
+          </a:p>
+          <a:p>
+            <a:pPr indent="0" eaLnBrk="1" hangingPunct="1"/>
+            <a:endParaRPr lang="en-US" dirty="0">
+              <a:latin typeface="Trebuchet MS" charset="0"/>
+              <a:ea typeface="ヒラギノ角ゴ ProN W3" charset="0"/>
+              <a:cs typeface="ヒラギノ角ゴ ProN W3" charset="0"/>
+            </a:endParaRPr>
+          </a:p>
+          <a:p>
+            <a:pPr indent="0" eaLnBrk="1" hangingPunct="1"/>
+            <a:r>
+              <a:rPr lang="en-US" dirty="0" smtClean="0">
+                <a:latin typeface="Trebuchet MS" charset="0"/>
+                <a:ea typeface="ヒラギノ角ゴ ProN W3" charset="0"/>
+                <a:cs typeface="ヒラギノ角ゴ ProN W3" charset="0"/>
+              </a:rPr>
+              <a:t>Animations are cool</a:t>
+            </a:r>
+          </a:p>
+          <a:p>
+            <a:pPr indent="0" eaLnBrk="1" hangingPunct="1"/>
+            <a:endParaRPr lang="en-US" dirty="0">
+              <a:latin typeface="Trebuchet MS" charset="0"/>
+              <a:ea typeface="ヒラギノ角ゴ ProN W3" charset="0"/>
+              <a:cs typeface="ヒラギノ角ゴ ProN W3" charset="0"/>
+            </a:endParaRPr>
+          </a:p>
+          <a:p>
+            <a:pPr indent="0" eaLnBrk="1" hangingPunct="1"/>
+            <a:endParaRPr lang="en-US" dirty="0">
+              <a:latin typeface="Trebuchet MS" charset="0"/>
+              <a:ea typeface="ヒラギノ角ゴ ProN W3" charset="0"/>
+              <a:cs typeface="ヒラギノ角ゴ ProN W3" charset="0"/>
             </a:endParaRPr>
           </a:p>
         </p:txBody>
@@ -8329,65 +8932,6 @@
           </a:extLst>
         </p:spPr>
       </p:pic>
-      <p:sp>
-        <p:nvSpPr>
-          <p:cNvPr id="18434" name="Rectangle 2"/>
-          <p:cNvSpPr>
-            <a:spLocks/>
-          </p:cNvSpPr>
-          <p:nvPr/>
-        </p:nvSpPr>
-        <p:spPr bwMode="auto">
-          <a:xfrm>
-            <a:off x="3124200" y="6696075"/>
-            <a:ext cx="2921000" cy="127000"/>
-          </a:xfrm>
-          <a:prstGeom prst="rect">
-            <a:avLst/>
-          </a:prstGeom>
-          <a:noFill/>
-          <a:ln>
-            <a:noFill/>
-          </a:ln>
-          <a:extLst>
-            <a:ext uri="{909E8E84-426E-40dd-AFC4-6F175D3DCCD1}">
-              <a14:hiddenFill xmlns:a14="http://schemas.microsoft.com/office/drawing/2010/main">
-                <a:solidFill>
-                  <a:srgbClr val="FFFFFF"/>
-                </a:solidFill>
-              </a14:hiddenFill>
-            </a:ext>
-            <a:ext uri="{91240B29-F687-4f45-9708-019B960494DF}">
-              <a14:hiddenLine xmlns:a14="http://schemas.microsoft.com/office/drawing/2010/main" w="9525">
-                <a:solidFill>
-                  <a:srgbClr val="000000"/>
-                </a:solidFill>
-                <a:miter lim="800000"/>
-                <a:headEnd/>
-                <a:tailEnd/>
-              </a14:hiddenLine>
-            </a:ext>
-          </a:extLst>
-        </p:spPr>
-        <p:txBody>
-          <a:bodyPr lIns="0" tIns="0" rIns="40639" bIns="0" anchor="ctr"/>
-          <a:lstStyle/>
-          <a:p>
-            <a:pPr marL="39688" algn="ctr"/>
-            <a:r>
-              <a:rPr lang="en-US" sz="800">
-                <a:solidFill>
-                  <a:srgbClr val="ACB8C0"/>
-                </a:solidFill>
-                <a:latin typeface="Helvetica" charset="0"/>
-                <a:cs typeface="Helvetica" charset="0"/>
-                <a:sym typeface="Helvetica" charset="0"/>
-              </a:rPr>
-              <a:t>© 2011 Appcelerator, Inc.</a:t>
-            </a:r>
-          </a:p>
-        </p:txBody>
-      </p:sp>
       <p:pic>
         <p:nvPicPr>
           <p:cNvPr id="18435" name="Picture 3"/>
@@ -8498,65 +9042,6 @@
       </p:pic>
       <p:sp>
         <p:nvSpPr>
-          <p:cNvPr id="18437" name="Rectangle 5"/>
-          <p:cNvSpPr>
-            <a:spLocks/>
-          </p:cNvSpPr>
-          <p:nvPr/>
-        </p:nvSpPr>
-        <p:spPr bwMode="auto">
-          <a:xfrm>
-            <a:off x="3124200" y="6696075"/>
-            <a:ext cx="2921000" cy="127000"/>
-          </a:xfrm>
-          <a:prstGeom prst="rect">
-            <a:avLst/>
-          </a:prstGeom>
-          <a:noFill/>
-          <a:ln>
-            <a:noFill/>
-          </a:ln>
-          <a:extLst>
-            <a:ext uri="{909E8E84-426E-40dd-AFC4-6F175D3DCCD1}">
-              <a14:hiddenFill xmlns:a14="http://schemas.microsoft.com/office/drawing/2010/main">
-                <a:solidFill>
-                  <a:srgbClr val="FFFFFF"/>
-                </a:solidFill>
-              </a14:hiddenFill>
-            </a:ext>
-            <a:ext uri="{91240B29-F687-4f45-9708-019B960494DF}">
-              <a14:hiddenLine xmlns:a14="http://schemas.microsoft.com/office/drawing/2010/main" w="9525">
-                <a:solidFill>
-                  <a:srgbClr val="000000"/>
-                </a:solidFill>
-                <a:miter lim="800000"/>
-                <a:headEnd/>
-                <a:tailEnd/>
-              </a14:hiddenLine>
-            </a:ext>
-          </a:extLst>
-        </p:spPr>
-        <p:txBody>
-          <a:bodyPr lIns="0" tIns="0" rIns="40639" bIns="0" anchor="ctr"/>
-          <a:lstStyle/>
-          <a:p>
-            <a:pPr marL="39688" algn="ctr"/>
-            <a:r>
-              <a:rPr lang="en-US" sz="800">
-                <a:solidFill>
-                  <a:srgbClr val="ACB8C0"/>
-                </a:solidFill>
-                <a:latin typeface="Helvetica" charset="0"/>
-                <a:cs typeface="Helvetica" charset="0"/>
-                <a:sym typeface="Helvetica" charset="0"/>
-              </a:rPr>
-              <a:t>© 2011 Appcelerator, Inc.</a:t>
-            </a:r>
-          </a:p>
-        </p:txBody>
-      </p:sp>
-      <p:sp>
-        <p:nvSpPr>
           <p:cNvPr id="18438" name="Rectangle 6"/>
           <p:cNvSpPr>
             <a:spLocks noGrp="1" noChangeArrowheads="1"/>
@@ -8588,6 +9073,75 @@
               <a:latin typeface="Trebuchet MS Bold" charset="0"/>
               <a:ea typeface="ヒラギノ角ゴ ProN W6" charset="0"/>
               <a:cs typeface="ヒラギノ角ゴ ProN W6" charset="0"/>
+            </a:endParaRPr>
+          </a:p>
+        </p:txBody>
+      </p:sp>
+      <p:sp>
+        <p:nvSpPr>
+          <p:cNvPr id="8" name="Rectangle 7"/>
+          <p:cNvSpPr>
+            <a:spLocks noGrp="1" noChangeArrowheads="1"/>
+          </p:cNvSpPr>
+          <p:nvPr>
+            <p:ph idx="1"/>
+          </p:nvPr>
+        </p:nvSpPr>
+        <p:spPr>
+          <a:xfrm>
+            <a:off x="152400" y="1346200"/>
+            <a:ext cx="8229600" cy="5359400"/>
+          </a:xfrm>
+        </p:spPr>
+        <p:txBody>
+          <a:bodyPr rIns="81279"/>
+          <a:lstStyle/>
+          <a:p>
+            <a:pPr indent="0" eaLnBrk="1" hangingPunct="1"/>
+            <a:r>
+              <a:rPr lang="en-US" dirty="0" smtClean="0">
+                <a:latin typeface="Trebuchet MS" charset="0"/>
+                <a:ea typeface="ヒラギノ角ゴ ProN W3" charset="0"/>
+                <a:cs typeface="ヒラギノ角ゴ ProN W3" charset="0"/>
+              </a:rPr>
+              <a:t>Add a modal picker in the </a:t>
+            </a:r>
+            <a:r>
+              <a:rPr lang="en-US" dirty="0" err="1" smtClean="0">
+                <a:latin typeface="Trebuchet MS" charset="0"/>
+                <a:ea typeface="ヒラギノ角ゴ ProN W3" charset="0"/>
+                <a:cs typeface="ヒラギノ角ゴ ProN W3" charset="0"/>
+              </a:rPr>
+              <a:t>titleControl</a:t>
+            </a:r>
+            <a:endParaRPr lang="en-US" dirty="0" smtClean="0">
+              <a:latin typeface="Trebuchet MS" charset="0"/>
+              <a:ea typeface="ヒラギノ角ゴ ProN W3" charset="0"/>
+              <a:cs typeface="ヒラギノ角ゴ ProN W3" charset="0"/>
+            </a:endParaRPr>
+          </a:p>
+          <a:p>
+            <a:pPr indent="0" eaLnBrk="1" hangingPunct="1"/>
+            <a:endParaRPr lang="en-US" dirty="0">
+              <a:latin typeface="Trebuchet MS" charset="0"/>
+              <a:ea typeface="ヒラギノ角ゴ ProN W3" charset="0"/>
+              <a:cs typeface="ヒラギノ角ゴ ProN W3" charset="0"/>
+            </a:endParaRPr>
+          </a:p>
+          <a:p>
+            <a:pPr indent="0" eaLnBrk="1" hangingPunct="1"/>
+            <a:r>
+              <a:rPr lang="en-US" dirty="0" smtClean="0">
+                <a:latin typeface="Trebuchet MS" charset="0"/>
+                <a:ea typeface="ヒラギノ角ゴ ProN W3" charset="0"/>
+                <a:cs typeface="ヒラギノ角ゴ ProN W3" charset="0"/>
+              </a:rPr>
+              <a:t>Trigger changes based on title</a:t>
+            </a:r>
+            <a:endParaRPr lang="en-US" dirty="0">
+              <a:latin typeface="Trebuchet MS" charset="0"/>
+              <a:ea typeface="ヒラギノ角ゴ ProN W3" charset="0"/>
+              <a:cs typeface="ヒラギノ角ゴ ProN W3" charset="0"/>
             </a:endParaRPr>
           </a:p>
         </p:txBody>
@@ -8684,65 +9238,6 @@
           </a:extLst>
         </p:spPr>
       </p:pic>
-      <p:sp>
-        <p:nvSpPr>
-          <p:cNvPr id="18434" name="Rectangle 2"/>
-          <p:cNvSpPr>
-            <a:spLocks/>
-          </p:cNvSpPr>
-          <p:nvPr/>
-        </p:nvSpPr>
-        <p:spPr bwMode="auto">
-          <a:xfrm>
-            <a:off x="3124200" y="6696075"/>
-            <a:ext cx="2921000" cy="127000"/>
-          </a:xfrm>
-          <a:prstGeom prst="rect">
-            <a:avLst/>
-          </a:prstGeom>
-          <a:noFill/>
-          <a:ln>
-            <a:noFill/>
-          </a:ln>
-          <a:extLst>
-            <a:ext uri="{909E8E84-426E-40dd-AFC4-6F175D3DCCD1}">
-              <a14:hiddenFill xmlns:a14="http://schemas.microsoft.com/office/drawing/2010/main">
-                <a:solidFill>
-                  <a:srgbClr val="FFFFFF"/>
-                </a:solidFill>
-              </a14:hiddenFill>
-            </a:ext>
-            <a:ext uri="{91240B29-F687-4f45-9708-019B960494DF}">
-              <a14:hiddenLine xmlns:a14="http://schemas.microsoft.com/office/drawing/2010/main" w="9525">
-                <a:solidFill>
-                  <a:srgbClr val="000000"/>
-                </a:solidFill>
-                <a:miter lim="800000"/>
-                <a:headEnd/>
-                <a:tailEnd/>
-              </a14:hiddenLine>
-            </a:ext>
-          </a:extLst>
-        </p:spPr>
-        <p:txBody>
-          <a:bodyPr lIns="0" tIns="0" rIns="40639" bIns="0" anchor="ctr"/>
-          <a:lstStyle/>
-          <a:p>
-            <a:pPr marL="39688" algn="ctr"/>
-            <a:r>
-              <a:rPr lang="en-US" sz="800">
-                <a:solidFill>
-                  <a:srgbClr val="ACB8C0"/>
-                </a:solidFill>
-                <a:latin typeface="Helvetica" charset="0"/>
-                <a:cs typeface="Helvetica" charset="0"/>
-                <a:sym typeface="Helvetica" charset="0"/>
-              </a:rPr>
-              <a:t>© 2011 Appcelerator, Inc.</a:t>
-            </a:r>
-          </a:p>
-        </p:txBody>
-      </p:sp>
       <p:pic>
         <p:nvPicPr>
           <p:cNvPr id="18435" name="Picture 3"/>
@@ -8853,65 +9348,6 @@
       </p:pic>
       <p:sp>
         <p:nvSpPr>
-          <p:cNvPr id="18437" name="Rectangle 5"/>
-          <p:cNvSpPr>
-            <a:spLocks/>
-          </p:cNvSpPr>
-          <p:nvPr/>
-        </p:nvSpPr>
-        <p:spPr bwMode="auto">
-          <a:xfrm>
-            <a:off x="3124200" y="6696075"/>
-            <a:ext cx="2921000" cy="127000"/>
-          </a:xfrm>
-          <a:prstGeom prst="rect">
-            <a:avLst/>
-          </a:prstGeom>
-          <a:noFill/>
-          <a:ln>
-            <a:noFill/>
-          </a:ln>
-          <a:extLst>
-            <a:ext uri="{909E8E84-426E-40dd-AFC4-6F175D3DCCD1}">
-              <a14:hiddenFill xmlns:a14="http://schemas.microsoft.com/office/drawing/2010/main">
-                <a:solidFill>
-                  <a:srgbClr val="FFFFFF"/>
-                </a:solidFill>
-              </a14:hiddenFill>
-            </a:ext>
-            <a:ext uri="{91240B29-F687-4f45-9708-019B960494DF}">
-              <a14:hiddenLine xmlns:a14="http://schemas.microsoft.com/office/drawing/2010/main" w="9525">
-                <a:solidFill>
-                  <a:srgbClr val="000000"/>
-                </a:solidFill>
-                <a:miter lim="800000"/>
-                <a:headEnd/>
-                <a:tailEnd/>
-              </a14:hiddenLine>
-            </a:ext>
-          </a:extLst>
-        </p:spPr>
-        <p:txBody>
-          <a:bodyPr lIns="0" tIns="0" rIns="40639" bIns="0" anchor="ctr"/>
-          <a:lstStyle/>
-          <a:p>
-            <a:pPr marL="39688" algn="ctr"/>
-            <a:r>
-              <a:rPr lang="en-US" sz="800">
-                <a:solidFill>
-                  <a:srgbClr val="ACB8C0"/>
-                </a:solidFill>
-                <a:latin typeface="Helvetica" charset="0"/>
-                <a:cs typeface="Helvetica" charset="0"/>
-                <a:sym typeface="Helvetica" charset="0"/>
-              </a:rPr>
-              <a:t>© 2011 Appcelerator, Inc.</a:t>
-            </a:r>
-          </a:p>
-        </p:txBody>
-      </p:sp>
-      <p:sp>
-        <p:nvSpPr>
           <p:cNvPr id="18438" name="Rectangle 6"/>
           <p:cNvSpPr>
             <a:spLocks noGrp="1" noChangeArrowheads="1"/>
@@ -8943,6 +9379,92 @@
               <a:latin typeface="Trebuchet MS Bold" charset="0"/>
               <a:ea typeface="ヒラギノ角ゴ ProN W6" charset="0"/>
               <a:cs typeface="ヒラギノ角ゴ ProN W6" charset="0"/>
+            </a:endParaRPr>
+          </a:p>
+        </p:txBody>
+      </p:sp>
+      <p:sp>
+        <p:nvSpPr>
+          <p:cNvPr id="8" name="Rectangle 7"/>
+          <p:cNvSpPr>
+            <a:spLocks noGrp="1" noChangeArrowheads="1"/>
+          </p:cNvSpPr>
+          <p:nvPr>
+            <p:ph idx="1"/>
+          </p:nvPr>
+        </p:nvSpPr>
+        <p:spPr>
+          <a:xfrm>
+            <a:off x="152400" y="1346200"/>
+            <a:ext cx="8229600" cy="5359400"/>
+          </a:xfrm>
+        </p:spPr>
+        <p:txBody>
+          <a:bodyPr rIns="81279"/>
+          <a:lstStyle/>
+          <a:p>
+            <a:pPr indent="0" eaLnBrk="1" hangingPunct="1"/>
+            <a:r>
+              <a:rPr lang="en-US" dirty="0" smtClean="0">
+                <a:latin typeface="Trebuchet MS" charset="0"/>
+                <a:ea typeface="ヒラギノ角ゴ ProN W3" charset="0"/>
+                <a:cs typeface="ヒラギノ角ゴ ProN W3" charset="0"/>
+              </a:rPr>
+              <a:t>Not widely used</a:t>
+            </a:r>
+          </a:p>
+          <a:p>
+            <a:pPr indent="0" eaLnBrk="1" hangingPunct="1"/>
+            <a:endParaRPr lang="en-US" dirty="0">
+              <a:latin typeface="Trebuchet MS" charset="0"/>
+              <a:ea typeface="ヒラギノ角ゴ ProN W3" charset="0"/>
+              <a:cs typeface="ヒラギノ角ゴ ProN W3" charset="0"/>
+            </a:endParaRPr>
+          </a:p>
+          <a:p>
+            <a:pPr indent="0" eaLnBrk="1" hangingPunct="1"/>
+            <a:r>
+              <a:rPr lang="en-US" dirty="0" smtClean="0">
+                <a:latin typeface="Trebuchet MS" charset="0"/>
+                <a:ea typeface="ヒラギノ角ゴ ProN W3" charset="0"/>
+                <a:cs typeface="ヒラギノ角ゴ ProN W3" charset="0"/>
+              </a:rPr>
+              <a:t>Can provide interesting results</a:t>
+            </a:r>
+          </a:p>
+          <a:p>
+            <a:pPr indent="0" eaLnBrk="1" hangingPunct="1"/>
+            <a:endParaRPr lang="en-US" dirty="0">
+              <a:latin typeface="Trebuchet MS" charset="0"/>
+              <a:ea typeface="ヒラギノ角ゴ ProN W3" charset="0"/>
+              <a:cs typeface="ヒラギノ角ゴ ProN W3" charset="0"/>
+            </a:endParaRPr>
+          </a:p>
+          <a:p>
+            <a:pPr indent="0" eaLnBrk="1" hangingPunct="1"/>
+            <a:r>
+              <a:rPr lang="en-US" dirty="0" smtClean="0">
+                <a:latin typeface="Trebuchet MS" charset="0"/>
+                <a:ea typeface="ヒラギノ角ゴ ProN W3" charset="0"/>
+                <a:cs typeface="ヒラギノ角ゴ ProN W3" charset="0"/>
+              </a:rPr>
+              <a:t>Cuts down on art overhead</a:t>
+            </a:r>
+          </a:p>
+          <a:p>
+            <a:pPr indent="0" eaLnBrk="1" hangingPunct="1"/>
+            <a:endParaRPr lang="en-US" dirty="0">
+              <a:latin typeface="Trebuchet MS" charset="0"/>
+              <a:ea typeface="ヒラギノ角ゴ ProN W3" charset="0"/>
+              <a:cs typeface="ヒラギノ角ゴ ProN W3" charset="0"/>
+            </a:endParaRPr>
+          </a:p>
+          <a:p>
+            <a:pPr indent="0" eaLnBrk="1" hangingPunct="1"/>
+            <a:endParaRPr lang="en-US" dirty="0">
+              <a:latin typeface="Trebuchet MS" charset="0"/>
+              <a:ea typeface="ヒラギノ角ゴ ProN W3" charset="0"/>
+              <a:cs typeface="ヒラギノ角ゴ ProN W3" charset="0"/>
             </a:endParaRPr>
           </a:p>
         </p:txBody>
@@ -9480,8 +10002,57 @@
                 <a:ea typeface="ヒラギノ角ゴ ProN W3" charset="0"/>
                 <a:cs typeface="ヒラギノ角ゴ ProN W3" charset="0"/>
               </a:rPr>
-              <a:t>Agenda goes here</a:t>
+              <a:t>Building on a good app</a:t>
             </a:r>
+          </a:p>
+          <a:p>
+            <a:pPr indent="0" eaLnBrk="1" hangingPunct="1"/>
+            <a:endParaRPr lang="en-US" dirty="0">
+              <a:latin typeface="Trebuchet MS" charset="0"/>
+              <a:ea typeface="ヒラギノ角ゴ ProN W3" charset="0"/>
+              <a:cs typeface="ヒラギノ角ゴ ProN W3" charset="0"/>
+            </a:endParaRPr>
+          </a:p>
+          <a:p>
+            <a:pPr indent="0" eaLnBrk="1" hangingPunct="1"/>
+            <a:r>
+              <a:rPr lang="en-US" dirty="0" smtClean="0">
+                <a:latin typeface="Trebuchet MS" charset="0"/>
+                <a:ea typeface="ヒラギノ角ゴ ProN W3" charset="0"/>
+                <a:cs typeface="ヒラギノ角ゴ ProN W3" charset="0"/>
+              </a:rPr>
+              <a:t>Developing custom navigation</a:t>
+            </a:r>
+          </a:p>
+          <a:p>
+            <a:pPr indent="0" eaLnBrk="1" hangingPunct="1"/>
+            <a:endParaRPr lang="en-US" dirty="0">
+              <a:latin typeface="Trebuchet MS" charset="0"/>
+              <a:ea typeface="ヒラギノ角ゴ ProN W3" charset="0"/>
+              <a:cs typeface="ヒラギノ角ゴ ProN W3" charset="0"/>
+            </a:endParaRPr>
+          </a:p>
+          <a:p>
+            <a:pPr indent="0" eaLnBrk="1" hangingPunct="1"/>
+            <a:r>
+              <a:rPr lang="en-US" dirty="0" smtClean="0">
+                <a:latin typeface="Trebuchet MS" charset="0"/>
+                <a:ea typeface="ヒラギノ角ゴ ProN W3" charset="0"/>
+                <a:cs typeface="ヒラギノ角ゴ ProN W3" charset="0"/>
+              </a:rPr>
+              <a:t>Getting the most out of your components</a:t>
+            </a:r>
+          </a:p>
+          <a:p>
+            <a:pPr indent="0" eaLnBrk="1" hangingPunct="1"/>
+            <a:endParaRPr lang="en-US" dirty="0">
+              <a:latin typeface="Trebuchet MS" charset="0"/>
+              <a:ea typeface="ヒラギノ角ゴ ProN W3" charset="0"/>
+              <a:cs typeface="ヒラギノ角ゴ ProN W3" charset="0"/>
+            </a:endParaRPr>
+          </a:p>
+          <a:p>
+            <a:pPr indent="0" eaLnBrk="1" hangingPunct="1"/>
             <a:endParaRPr lang="en-US" dirty="0">
               <a:latin typeface="Trebuchet MS" charset="0"/>
               <a:ea typeface="ヒラギノ角ゴ ProN W3" charset="0"/>
@@ -9709,65 +10280,6 @@
           </a:extLst>
         </p:spPr>
       </p:pic>
-      <p:sp>
-        <p:nvSpPr>
-          <p:cNvPr id="18434" name="Rectangle 2"/>
-          <p:cNvSpPr>
-            <a:spLocks/>
-          </p:cNvSpPr>
-          <p:nvPr/>
-        </p:nvSpPr>
-        <p:spPr bwMode="auto">
-          <a:xfrm>
-            <a:off x="3124200" y="6696075"/>
-            <a:ext cx="2921000" cy="127000"/>
-          </a:xfrm>
-          <a:prstGeom prst="rect">
-            <a:avLst/>
-          </a:prstGeom>
-          <a:noFill/>
-          <a:ln>
-            <a:noFill/>
-          </a:ln>
-          <a:extLst>
-            <a:ext uri="{909E8E84-426E-40dd-AFC4-6F175D3DCCD1}">
-              <a14:hiddenFill xmlns:a14="http://schemas.microsoft.com/office/drawing/2010/main">
-                <a:solidFill>
-                  <a:srgbClr val="FFFFFF"/>
-                </a:solidFill>
-              </a14:hiddenFill>
-            </a:ext>
-            <a:ext uri="{91240B29-F687-4f45-9708-019B960494DF}">
-              <a14:hiddenLine xmlns:a14="http://schemas.microsoft.com/office/drawing/2010/main" w="9525">
-                <a:solidFill>
-                  <a:srgbClr val="000000"/>
-                </a:solidFill>
-                <a:miter lim="800000"/>
-                <a:headEnd/>
-                <a:tailEnd/>
-              </a14:hiddenLine>
-            </a:ext>
-          </a:extLst>
-        </p:spPr>
-        <p:txBody>
-          <a:bodyPr lIns="0" tIns="0" rIns="40639" bIns="0" anchor="ctr"/>
-          <a:lstStyle/>
-          <a:p>
-            <a:pPr marL="39688" algn="ctr"/>
-            <a:r>
-              <a:rPr lang="en-US" sz="800">
-                <a:solidFill>
-                  <a:srgbClr val="ACB8C0"/>
-                </a:solidFill>
-                <a:latin typeface="Helvetica" charset="0"/>
-                <a:cs typeface="Helvetica" charset="0"/>
-                <a:sym typeface="Helvetica" charset="0"/>
-              </a:rPr>
-              <a:t>© 2011 Appcelerator, Inc.</a:t>
-            </a:r>
-          </a:p>
-        </p:txBody>
-      </p:sp>
       <p:pic>
         <p:nvPicPr>
           <p:cNvPr id="18435" name="Picture 3"/>
@@ -9878,65 +10390,6 @@
       </p:pic>
       <p:sp>
         <p:nvSpPr>
-          <p:cNvPr id="18437" name="Rectangle 5"/>
-          <p:cNvSpPr>
-            <a:spLocks/>
-          </p:cNvSpPr>
-          <p:nvPr/>
-        </p:nvSpPr>
-        <p:spPr bwMode="auto">
-          <a:xfrm>
-            <a:off x="3124200" y="6696075"/>
-            <a:ext cx="2921000" cy="127000"/>
-          </a:xfrm>
-          <a:prstGeom prst="rect">
-            <a:avLst/>
-          </a:prstGeom>
-          <a:noFill/>
-          <a:ln>
-            <a:noFill/>
-          </a:ln>
-          <a:extLst>
-            <a:ext uri="{909E8E84-426E-40dd-AFC4-6F175D3DCCD1}">
-              <a14:hiddenFill xmlns:a14="http://schemas.microsoft.com/office/drawing/2010/main">
-                <a:solidFill>
-                  <a:srgbClr val="FFFFFF"/>
-                </a:solidFill>
-              </a14:hiddenFill>
-            </a:ext>
-            <a:ext uri="{91240B29-F687-4f45-9708-019B960494DF}">
-              <a14:hiddenLine xmlns:a14="http://schemas.microsoft.com/office/drawing/2010/main" w="9525">
-                <a:solidFill>
-                  <a:srgbClr val="000000"/>
-                </a:solidFill>
-                <a:miter lim="800000"/>
-                <a:headEnd/>
-                <a:tailEnd/>
-              </a14:hiddenLine>
-            </a:ext>
-          </a:extLst>
-        </p:spPr>
-        <p:txBody>
-          <a:bodyPr lIns="0" tIns="0" rIns="40639" bIns="0" anchor="ctr"/>
-          <a:lstStyle/>
-          <a:p>
-            <a:pPr marL="39688" algn="ctr"/>
-            <a:r>
-              <a:rPr lang="en-US" sz="800">
-                <a:solidFill>
-                  <a:srgbClr val="ACB8C0"/>
-                </a:solidFill>
-                <a:latin typeface="Helvetica" charset="0"/>
-                <a:cs typeface="Helvetica" charset="0"/>
-                <a:sym typeface="Helvetica" charset="0"/>
-              </a:rPr>
-              <a:t>© 2011 Appcelerator, Inc.</a:t>
-            </a:r>
-          </a:p>
-        </p:txBody>
-      </p:sp>
-      <p:sp>
-        <p:nvSpPr>
           <p:cNvPr id="18438" name="Rectangle 6"/>
           <p:cNvSpPr>
             <a:spLocks noGrp="1" noChangeArrowheads="1"/>
@@ -9968,6 +10421,89 @@
               <a:latin typeface="Trebuchet MS Bold" charset="0"/>
               <a:ea typeface="ヒラギノ角ゴ ProN W6" charset="0"/>
               <a:cs typeface="ヒラギノ角ゴ ProN W6" charset="0"/>
+            </a:endParaRPr>
+          </a:p>
+        </p:txBody>
+      </p:sp>
+      <p:sp>
+        <p:nvSpPr>
+          <p:cNvPr id="8" name="Rectangle 7"/>
+          <p:cNvSpPr>
+            <a:spLocks noGrp="1" noChangeArrowheads="1"/>
+          </p:cNvSpPr>
+          <p:nvPr>
+            <p:ph idx="1"/>
+          </p:nvPr>
+        </p:nvSpPr>
+        <p:spPr>
+          <a:xfrm>
+            <a:off x="152400" y="1346200"/>
+            <a:ext cx="8229600" cy="4826000"/>
+          </a:xfrm>
+        </p:spPr>
+        <p:txBody>
+          <a:bodyPr rIns="81279"/>
+          <a:lstStyle/>
+          <a:p>
+            <a:pPr indent="0" eaLnBrk="1" hangingPunct="1"/>
+            <a:r>
+              <a:rPr lang="en-US" dirty="0" smtClean="0">
+                <a:latin typeface="Trebuchet MS" charset="0"/>
+                <a:ea typeface="ヒラギノ角ゴ ProN W3" charset="0"/>
+                <a:cs typeface="ヒラギノ角ゴ ProN W3" charset="0"/>
+              </a:rPr>
+              <a:t>Understanding Your Consumer</a:t>
+            </a:r>
+          </a:p>
+          <a:p>
+            <a:pPr indent="0" eaLnBrk="1" hangingPunct="1"/>
+            <a:endParaRPr lang="en-US" dirty="0">
+              <a:latin typeface="Trebuchet MS" charset="0"/>
+              <a:ea typeface="ヒラギノ角ゴ ProN W3" charset="0"/>
+              <a:cs typeface="ヒラギノ角ゴ ProN W3" charset="0"/>
+            </a:endParaRPr>
+          </a:p>
+          <a:p>
+            <a:pPr indent="0" eaLnBrk="1" hangingPunct="1"/>
+            <a:r>
+              <a:rPr lang="en-US" dirty="0" smtClean="0">
+                <a:latin typeface="Trebuchet MS" charset="0"/>
+                <a:ea typeface="ヒラギノ角ゴ ProN W3" charset="0"/>
+                <a:cs typeface="ヒラギノ角ゴ ProN W3" charset="0"/>
+              </a:rPr>
+              <a:t>Develop a Single Page Brand</a:t>
+            </a:r>
+          </a:p>
+          <a:p>
+            <a:pPr indent="0" eaLnBrk="1" hangingPunct="1"/>
+            <a:endParaRPr lang="en-US" dirty="0">
+              <a:latin typeface="Trebuchet MS" charset="0"/>
+              <a:ea typeface="ヒラギノ角ゴ ProN W3" charset="0"/>
+              <a:cs typeface="ヒラギノ角ゴ ProN W3" charset="0"/>
+            </a:endParaRPr>
+          </a:p>
+          <a:p>
+            <a:pPr indent="0" eaLnBrk="1" hangingPunct="1"/>
+            <a:r>
+              <a:rPr lang="en-US" dirty="0" smtClean="0">
+                <a:latin typeface="Trebuchet MS" charset="0"/>
+                <a:ea typeface="ヒラギノ角ゴ ProN W3" charset="0"/>
+                <a:cs typeface="ヒラギノ角ゴ ProN W3" charset="0"/>
+              </a:rPr>
+              <a:t>Know the Emotion, Style &amp; Location</a:t>
+            </a:r>
+            <a:endParaRPr lang="en-US" dirty="0">
+              <a:latin typeface="Trebuchet MS" charset="0"/>
+              <a:ea typeface="ヒラギノ角ゴ ProN W3" charset="0"/>
+              <a:cs typeface="ヒラギノ角ゴ ProN W3" charset="0"/>
+            </a:endParaRPr>
+          </a:p>
+          <a:p>
+            <a:pPr indent="0" eaLnBrk="1" hangingPunct="1"/>
+            <a:endParaRPr lang="en-US" dirty="0">
+              <a:latin typeface="Trebuchet MS" charset="0"/>
+              <a:ea typeface="ヒラギノ角ゴ ProN W3" charset="0"/>
+              <a:cs typeface="ヒラギノ角ゴ ProN W3" charset="0"/>
             </a:endParaRPr>
           </a:p>
         </p:txBody>
@@ -10064,65 +10600,6 @@
           </a:extLst>
         </p:spPr>
       </p:pic>
-      <p:sp>
-        <p:nvSpPr>
-          <p:cNvPr id="18434" name="Rectangle 2"/>
-          <p:cNvSpPr>
-            <a:spLocks/>
-          </p:cNvSpPr>
-          <p:nvPr/>
-        </p:nvSpPr>
-        <p:spPr bwMode="auto">
-          <a:xfrm>
-            <a:off x="3124200" y="6696075"/>
-            <a:ext cx="2921000" cy="127000"/>
-          </a:xfrm>
-          <a:prstGeom prst="rect">
-            <a:avLst/>
-          </a:prstGeom>
-          <a:noFill/>
-          <a:ln>
-            <a:noFill/>
-          </a:ln>
-          <a:extLst>
-            <a:ext uri="{909E8E84-426E-40dd-AFC4-6F175D3DCCD1}">
-              <a14:hiddenFill xmlns:a14="http://schemas.microsoft.com/office/drawing/2010/main">
-                <a:solidFill>
-                  <a:srgbClr val="FFFFFF"/>
-                </a:solidFill>
-              </a14:hiddenFill>
-            </a:ext>
-            <a:ext uri="{91240B29-F687-4f45-9708-019B960494DF}">
-              <a14:hiddenLine xmlns:a14="http://schemas.microsoft.com/office/drawing/2010/main" w="9525">
-                <a:solidFill>
-                  <a:srgbClr val="000000"/>
-                </a:solidFill>
-                <a:miter lim="800000"/>
-                <a:headEnd/>
-                <a:tailEnd/>
-              </a14:hiddenLine>
-            </a:ext>
-          </a:extLst>
-        </p:spPr>
-        <p:txBody>
-          <a:bodyPr lIns="0" tIns="0" rIns="40639" bIns="0" anchor="ctr"/>
-          <a:lstStyle/>
-          <a:p>
-            <a:pPr marL="39688" algn="ctr"/>
-            <a:r>
-              <a:rPr lang="en-US" sz="800">
-                <a:solidFill>
-                  <a:srgbClr val="ACB8C0"/>
-                </a:solidFill>
-                <a:latin typeface="Helvetica" charset="0"/>
-                <a:cs typeface="Helvetica" charset="0"/>
-                <a:sym typeface="Helvetica" charset="0"/>
-              </a:rPr>
-              <a:t>© 2011 Appcelerator, Inc.</a:t>
-            </a:r>
-          </a:p>
-        </p:txBody>
-      </p:sp>
       <p:pic>
         <p:nvPicPr>
           <p:cNvPr id="18435" name="Picture 3"/>
@@ -10233,65 +10710,6 @@
       </p:pic>
       <p:sp>
         <p:nvSpPr>
-          <p:cNvPr id="18437" name="Rectangle 5"/>
-          <p:cNvSpPr>
-            <a:spLocks/>
-          </p:cNvSpPr>
-          <p:nvPr/>
-        </p:nvSpPr>
-        <p:spPr bwMode="auto">
-          <a:xfrm>
-            <a:off x="3124200" y="6696075"/>
-            <a:ext cx="2921000" cy="127000"/>
-          </a:xfrm>
-          <a:prstGeom prst="rect">
-            <a:avLst/>
-          </a:prstGeom>
-          <a:noFill/>
-          <a:ln>
-            <a:noFill/>
-          </a:ln>
-          <a:extLst>
-            <a:ext uri="{909E8E84-426E-40dd-AFC4-6F175D3DCCD1}">
-              <a14:hiddenFill xmlns:a14="http://schemas.microsoft.com/office/drawing/2010/main">
-                <a:solidFill>
-                  <a:srgbClr val="FFFFFF"/>
-                </a:solidFill>
-              </a14:hiddenFill>
-            </a:ext>
-            <a:ext uri="{91240B29-F687-4f45-9708-019B960494DF}">
-              <a14:hiddenLine xmlns:a14="http://schemas.microsoft.com/office/drawing/2010/main" w="9525">
-                <a:solidFill>
-                  <a:srgbClr val="000000"/>
-                </a:solidFill>
-                <a:miter lim="800000"/>
-                <a:headEnd/>
-                <a:tailEnd/>
-              </a14:hiddenLine>
-            </a:ext>
-          </a:extLst>
-        </p:spPr>
-        <p:txBody>
-          <a:bodyPr lIns="0" tIns="0" rIns="40639" bIns="0" anchor="ctr"/>
-          <a:lstStyle/>
-          <a:p>
-            <a:pPr marL="39688" algn="ctr"/>
-            <a:r>
-              <a:rPr lang="en-US" sz="800">
-                <a:solidFill>
-                  <a:srgbClr val="ACB8C0"/>
-                </a:solidFill>
-                <a:latin typeface="Helvetica" charset="0"/>
-                <a:cs typeface="Helvetica" charset="0"/>
-                <a:sym typeface="Helvetica" charset="0"/>
-              </a:rPr>
-              <a:t>© 2011 Appcelerator, Inc.</a:t>
-            </a:r>
-          </a:p>
-        </p:txBody>
-      </p:sp>
-      <p:sp>
-        <p:nvSpPr>
           <p:cNvPr id="18438" name="Rectangle 6"/>
           <p:cNvSpPr>
             <a:spLocks noGrp="1" noChangeArrowheads="1"/>
@@ -10323,6 +10741,92 @@
               <a:latin typeface="Trebuchet MS Bold" charset="0"/>
               <a:ea typeface="ヒラギノ角ゴ ProN W6" charset="0"/>
               <a:cs typeface="ヒラギノ角ゴ ProN W6" charset="0"/>
+            </a:endParaRPr>
+          </a:p>
+        </p:txBody>
+      </p:sp>
+      <p:sp>
+        <p:nvSpPr>
+          <p:cNvPr id="8" name="Rectangle 7"/>
+          <p:cNvSpPr>
+            <a:spLocks noGrp="1" noChangeArrowheads="1"/>
+          </p:cNvSpPr>
+          <p:nvPr>
+            <p:ph idx="1"/>
+          </p:nvPr>
+        </p:nvSpPr>
+        <p:spPr>
+          <a:xfrm>
+            <a:off x="152400" y="1346200"/>
+            <a:ext cx="8229600" cy="5359400"/>
+          </a:xfrm>
+        </p:spPr>
+        <p:txBody>
+          <a:bodyPr rIns="81279"/>
+          <a:lstStyle/>
+          <a:p>
+            <a:pPr indent="0" eaLnBrk="1" hangingPunct="1"/>
+            <a:r>
+              <a:rPr lang="en-US" dirty="0" smtClean="0">
+                <a:latin typeface="Trebuchet MS" charset="0"/>
+                <a:ea typeface="ヒラギノ角ゴ ProN W3" charset="0"/>
+                <a:cs typeface="ヒラギノ角ゴ ProN W3" charset="0"/>
+              </a:rPr>
+              <a:t>App Icons &amp; Default Screens</a:t>
+            </a:r>
+          </a:p>
+          <a:p>
+            <a:pPr indent="0" eaLnBrk="1" hangingPunct="1"/>
+            <a:endParaRPr lang="en-US" dirty="0">
+              <a:latin typeface="Trebuchet MS" charset="0"/>
+              <a:ea typeface="ヒラギノ角ゴ ProN W3" charset="0"/>
+              <a:cs typeface="ヒラギノ角ゴ ProN W3" charset="0"/>
+            </a:endParaRPr>
+          </a:p>
+          <a:p>
+            <a:pPr indent="0" eaLnBrk="1" hangingPunct="1"/>
+            <a:r>
+              <a:rPr lang="en-US" dirty="0" smtClean="0">
+                <a:latin typeface="Trebuchet MS" charset="0"/>
+                <a:ea typeface="ヒラギノ角ゴ ProN W3" charset="0"/>
+                <a:cs typeface="ヒラギノ角ゴ ProN W3" charset="0"/>
+              </a:rPr>
+              <a:t>Colors &amp; UX</a:t>
+            </a:r>
+          </a:p>
+          <a:p>
+            <a:pPr indent="0" eaLnBrk="1" hangingPunct="1"/>
+            <a:endParaRPr lang="en-US" dirty="0">
+              <a:latin typeface="Trebuchet MS" charset="0"/>
+              <a:ea typeface="ヒラギノ角ゴ ProN W3" charset="0"/>
+              <a:cs typeface="ヒラギノ角ゴ ProN W3" charset="0"/>
+            </a:endParaRPr>
+          </a:p>
+          <a:p>
+            <a:pPr indent="0" eaLnBrk="1" hangingPunct="1"/>
+            <a:r>
+              <a:rPr lang="en-US" dirty="0" smtClean="0">
+                <a:latin typeface="Trebuchet MS" charset="0"/>
+                <a:ea typeface="ヒラギノ角ゴ ProN W3" charset="0"/>
+                <a:cs typeface="ヒラギノ角ゴ ProN W3" charset="0"/>
+              </a:rPr>
+              <a:t>UI Components</a:t>
+            </a:r>
+          </a:p>
+          <a:p>
+            <a:pPr indent="0" eaLnBrk="1" hangingPunct="1"/>
+            <a:endParaRPr lang="en-US" dirty="0">
+              <a:latin typeface="Trebuchet MS" charset="0"/>
+              <a:ea typeface="ヒラギノ角ゴ ProN W3" charset="0"/>
+              <a:cs typeface="ヒラギノ角ゴ ProN W3" charset="0"/>
+            </a:endParaRPr>
+          </a:p>
+          <a:p>
+            <a:pPr indent="0" eaLnBrk="1" hangingPunct="1"/>
+            <a:endParaRPr lang="en-US" dirty="0">
+              <a:latin typeface="Trebuchet MS" charset="0"/>
+              <a:ea typeface="ヒラギノ角ゴ ProN W3" charset="0"/>
+              <a:cs typeface="ヒラギノ角ゴ ProN W3" charset="0"/>
             </a:endParaRPr>
           </a:p>
         </p:txBody>
@@ -10419,65 +10923,6 @@
           </a:extLst>
         </p:spPr>
       </p:pic>
-      <p:sp>
-        <p:nvSpPr>
-          <p:cNvPr id="18434" name="Rectangle 2"/>
-          <p:cNvSpPr>
-            <a:spLocks/>
-          </p:cNvSpPr>
-          <p:nvPr/>
-        </p:nvSpPr>
-        <p:spPr bwMode="auto">
-          <a:xfrm>
-            <a:off x="3124200" y="6696075"/>
-            <a:ext cx="2921000" cy="127000"/>
-          </a:xfrm>
-          <a:prstGeom prst="rect">
-            <a:avLst/>
-          </a:prstGeom>
-          <a:noFill/>
-          <a:ln>
-            <a:noFill/>
-          </a:ln>
-          <a:extLst>
-            <a:ext uri="{909E8E84-426E-40dd-AFC4-6F175D3DCCD1}">
-              <a14:hiddenFill xmlns:a14="http://schemas.microsoft.com/office/drawing/2010/main">
-                <a:solidFill>
-                  <a:srgbClr val="FFFFFF"/>
-                </a:solidFill>
-              </a14:hiddenFill>
-            </a:ext>
-            <a:ext uri="{91240B29-F687-4f45-9708-019B960494DF}">
-              <a14:hiddenLine xmlns:a14="http://schemas.microsoft.com/office/drawing/2010/main" w="9525">
-                <a:solidFill>
-                  <a:srgbClr val="000000"/>
-                </a:solidFill>
-                <a:miter lim="800000"/>
-                <a:headEnd/>
-                <a:tailEnd/>
-              </a14:hiddenLine>
-            </a:ext>
-          </a:extLst>
-        </p:spPr>
-        <p:txBody>
-          <a:bodyPr lIns="0" tIns="0" rIns="40639" bIns="0" anchor="ctr"/>
-          <a:lstStyle/>
-          <a:p>
-            <a:pPr marL="39688" algn="ctr"/>
-            <a:r>
-              <a:rPr lang="en-US" sz="800">
-                <a:solidFill>
-                  <a:srgbClr val="ACB8C0"/>
-                </a:solidFill>
-                <a:latin typeface="Helvetica" charset="0"/>
-                <a:cs typeface="Helvetica" charset="0"/>
-                <a:sym typeface="Helvetica" charset="0"/>
-              </a:rPr>
-              <a:t>© 2011 Appcelerator, Inc.</a:t>
-            </a:r>
-          </a:p>
-        </p:txBody>
-      </p:sp>
       <p:pic>
         <p:nvPicPr>
           <p:cNvPr id="18435" name="Picture 3"/>
@@ -10588,65 +11033,6 @@
       </p:pic>
       <p:sp>
         <p:nvSpPr>
-          <p:cNvPr id="18437" name="Rectangle 5"/>
-          <p:cNvSpPr>
-            <a:spLocks/>
-          </p:cNvSpPr>
-          <p:nvPr/>
-        </p:nvSpPr>
-        <p:spPr bwMode="auto">
-          <a:xfrm>
-            <a:off x="3124200" y="6696075"/>
-            <a:ext cx="2921000" cy="127000"/>
-          </a:xfrm>
-          <a:prstGeom prst="rect">
-            <a:avLst/>
-          </a:prstGeom>
-          <a:noFill/>
-          <a:ln>
-            <a:noFill/>
-          </a:ln>
-          <a:extLst>
-            <a:ext uri="{909E8E84-426E-40dd-AFC4-6F175D3DCCD1}">
-              <a14:hiddenFill xmlns:a14="http://schemas.microsoft.com/office/drawing/2010/main">
-                <a:solidFill>
-                  <a:srgbClr val="FFFFFF"/>
-                </a:solidFill>
-              </a14:hiddenFill>
-            </a:ext>
-            <a:ext uri="{91240B29-F687-4f45-9708-019B960494DF}">
-              <a14:hiddenLine xmlns:a14="http://schemas.microsoft.com/office/drawing/2010/main" w="9525">
-                <a:solidFill>
-                  <a:srgbClr val="000000"/>
-                </a:solidFill>
-                <a:miter lim="800000"/>
-                <a:headEnd/>
-                <a:tailEnd/>
-              </a14:hiddenLine>
-            </a:ext>
-          </a:extLst>
-        </p:spPr>
-        <p:txBody>
-          <a:bodyPr lIns="0" tIns="0" rIns="40639" bIns="0" anchor="ctr"/>
-          <a:lstStyle/>
-          <a:p>
-            <a:pPr marL="39688" algn="ctr"/>
-            <a:r>
-              <a:rPr lang="en-US" sz="800">
-                <a:solidFill>
-                  <a:srgbClr val="ACB8C0"/>
-                </a:solidFill>
-                <a:latin typeface="Helvetica" charset="0"/>
-                <a:cs typeface="Helvetica" charset="0"/>
-                <a:sym typeface="Helvetica" charset="0"/>
-              </a:rPr>
-              <a:t>© 2011 Appcelerator, Inc.</a:t>
-            </a:r>
-          </a:p>
-        </p:txBody>
-      </p:sp>
-      <p:sp>
-        <p:nvSpPr>
           <p:cNvPr id="18438" name="Rectangle 6"/>
           <p:cNvSpPr>
             <a:spLocks noGrp="1" noChangeArrowheads="1"/>
@@ -10678,6 +11064,108 @@
               <a:latin typeface="Trebuchet MS Bold" charset="0"/>
               <a:ea typeface="ヒラギノ角ゴ ProN W6" charset="0"/>
               <a:cs typeface="ヒラギノ角ゴ ProN W6" charset="0"/>
+            </a:endParaRPr>
+          </a:p>
+        </p:txBody>
+      </p:sp>
+      <p:sp>
+        <p:nvSpPr>
+          <p:cNvPr id="8" name="Rectangle 7"/>
+          <p:cNvSpPr>
+            <a:spLocks noGrp="1" noChangeArrowheads="1"/>
+          </p:cNvSpPr>
+          <p:nvPr>
+            <p:ph idx="1"/>
+          </p:nvPr>
+        </p:nvSpPr>
+        <p:spPr>
+          <a:xfrm>
+            <a:off x="152400" y="1346200"/>
+            <a:ext cx="8229600" cy="5359400"/>
+          </a:xfrm>
+        </p:spPr>
+        <p:txBody>
+          <a:bodyPr rIns="81279"/>
+          <a:lstStyle/>
+          <a:p>
+            <a:pPr indent="0" eaLnBrk="1" hangingPunct="1"/>
+            <a:r>
+              <a:rPr lang="en-US" dirty="0" smtClean="0">
+                <a:latin typeface="Trebuchet MS" charset="0"/>
+                <a:ea typeface="ヒラギノ角ゴ ProN W3" charset="0"/>
+                <a:cs typeface="ヒラギノ角ゴ ProN W3" charset="0"/>
+              </a:rPr>
+              <a:t>One of the quickest and easiest items</a:t>
+            </a:r>
+          </a:p>
+          <a:p>
+            <a:pPr indent="0" eaLnBrk="1" hangingPunct="1"/>
+            <a:endParaRPr lang="en-US" dirty="0">
+              <a:latin typeface="Trebuchet MS" charset="0"/>
+              <a:ea typeface="ヒラギノ角ゴ ProN W3" charset="0"/>
+              <a:cs typeface="ヒラギノ角ゴ ProN W3" charset="0"/>
+            </a:endParaRPr>
+          </a:p>
+          <a:p>
+            <a:pPr indent="0" eaLnBrk="1" hangingPunct="1"/>
+            <a:r>
+              <a:rPr lang="en-US" dirty="0" smtClean="0">
+                <a:latin typeface="Trebuchet MS" charset="0"/>
+                <a:ea typeface="ヒラギノ角ゴ ProN W3" charset="0"/>
+                <a:cs typeface="ヒラギノ角ゴ ProN W3" charset="0"/>
+              </a:rPr>
+              <a:t>Don’t over use</a:t>
+            </a:r>
+          </a:p>
+          <a:p>
+            <a:pPr indent="0" eaLnBrk="1" hangingPunct="1"/>
+            <a:endParaRPr lang="en-US" dirty="0">
+              <a:latin typeface="Trebuchet MS" charset="0"/>
+              <a:ea typeface="ヒラギノ角ゴ ProN W3" charset="0"/>
+              <a:cs typeface="ヒラギノ角ゴ ProN W3" charset="0"/>
+            </a:endParaRPr>
+          </a:p>
+          <a:p>
+            <a:pPr indent="0" eaLnBrk="1" hangingPunct="1"/>
+            <a:r>
+              <a:rPr lang="en-US" dirty="0" smtClean="0">
+                <a:latin typeface="Trebuchet MS" charset="0"/>
+                <a:ea typeface="ヒラギノ角ゴ ProN W3" charset="0"/>
+                <a:cs typeface="ヒラギノ角ゴ ProN W3" charset="0"/>
+              </a:rPr>
+              <a:t>Use where appropriate</a:t>
+            </a:r>
+          </a:p>
+          <a:p>
+            <a:pPr indent="0" eaLnBrk="1" hangingPunct="1"/>
+            <a:endParaRPr lang="en-US" dirty="0">
+              <a:latin typeface="Trebuchet MS" charset="0"/>
+              <a:ea typeface="ヒラギノ角ゴ ProN W3" charset="0"/>
+              <a:cs typeface="ヒラギノ角ゴ ProN W3" charset="0"/>
+            </a:endParaRPr>
+          </a:p>
+          <a:p>
+            <a:pPr indent="0" eaLnBrk="1" hangingPunct="1"/>
+            <a:r>
+              <a:rPr lang="en-US" dirty="0" smtClean="0">
+                <a:latin typeface="Trebuchet MS" charset="0"/>
+                <a:ea typeface="ヒラギノ角ゴ ProN W3" charset="0"/>
+                <a:cs typeface="ヒラギノ角ゴ ProN W3" charset="0"/>
+              </a:rPr>
+              <a:t>Adhere to brand</a:t>
+            </a:r>
+            <a:endParaRPr lang="en-US" dirty="0">
+              <a:latin typeface="Trebuchet MS" charset="0"/>
+              <a:ea typeface="ヒラギノ角ゴ ProN W3" charset="0"/>
+              <a:cs typeface="ヒラギノ角ゴ ProN W3" charset="0"/>
+            </a:endParaRPr>
+          </a:p>
+          <a:p>
+            <a:pPr indent="0" eaLnBrk="1" hangingPunct="1"/>
+            <a:endParaRPr lang="en-US" dirty="0">
+              <a:latin typeface="Trebuchet MS" charset="0"/>
+              <a:ea typeface="ヒラギノ角ゴ ProN W3" charset="0"/>
+              <a:cs typeface="ヒラギノ角ゴ ProN W3" charset="0"/>
             </a:endParaRPr>
           </a:p>
         </p:txBody>
@@ -10911,65 +11399,6 @@
           </a:extLst>
         </p:spPr>
       </p:pic>
-      <p:sp>
-        <p:nvSpPr>
-          <p:cNvPr id="18434" name="Rectangle 2"/>
-          <p:cNvSpPr>
-            <a:spLocks/>
-          </p:cNvSpPr>
-          <p:nvPr/>
-        </p:nvSpPr>
-        <p:spPr bwMode="auto">
-          <a:xfrm>
-            <a:off x="3124200" y="6696075"/>
-            <a:ext cx="2921000" cy="127000"/>
-          </a:xfrm>
-          <a:prstGeom prst="rect">
-            <a:avLst/>
-          </a:prstGeom>
-          <a:noFill/>
-          <a:ln>
-            <a:noFill/>
-          </a:ln>
-          <a:extLst>
-            <a:ext uri="{909E8E84-426E-40dd-AFC4-6F175D3DCCD1}">
-              <a14:hiddenFill xmlns:a14="http://schemas.microsoft.com/office/drawing/2010/main">
-                <a:solidFill>
-                  <a:srgbClr val="FFFFFF"/>
-                </a:solidFill>
-              </a14:hiddenFill>
-            </a:ext>
-            <a:ext uri="{91240B29-F687-4f45-9708-019B960494DF}">
-              <a14:hiddenLine xmlns:a14="http://schemas.microsoft.com/office/drawing/2010/main" w="9525">
-                <a:solidFill>
-                  <a:srgbClr val="000000"/>
-                </a:solidFill>
-                <a:miter lim="800000"/>
-                <a:headEnd/>
-                <a:tailEnd/>
-              </a14:hiddenLine>
-            </a:ext>
-          </a:extLst>
-        </p:spPr>
-        <p:txBody>
-          <a:bodyPr lIns="0" tIns="0" rIns="40639" bIns="0" anchor="ctr"/>
-          <a:lstStyle/>
-          <a:p>
-            <a:pPr marL="39688" algn="ctr"/>
-            <a:r>
-              <a:rPr lang="en-US" sz="800">
-                <a:solidFill>
-                  <a:srgbClr val="ACB8C0"/>
-                </a:solidFill>
-                <a:latin typeface="Helvetica" charset="0"/>
-                <a:cs typeface="Helvetica" charset="0"/>
-                <a:sym typeface="Helvetica" charset="0"/>
-              </a:rPr>
-              <a:t>© 2011 Appcelerator, Inc.</a:t>
-            </a:r>
-          </a:p>
-        </p:txBody>
-      </p:sp>
       <p:pic>
         <p:nvPicPr>
           <p:cNvPr id="18435" name="Picture 3"/>
@@ -11080,65 +11509,6 @@
       </p:pic>
       <p:sp>
         <p:nvSpPr>
-          <p:cNvPr id="18437" name="Rectangle 5"/>
-          <p:cNvSpPr>
-            <a:spLocks/>
-          </p:cNvSpPr>
-          <p:nvPr/>
-        </p:nvSpPr>
-        <p:spPr bwMode="auto">
-          <a:xfrm>
-            <a:off x="3124200" y="6696075"/>
-            <a:ext cx="2921000" cy="127000"/>
-          </a:xfrm>
-          <a:prstGeom prst="rect">
-            <a:avLst/>
-          </a:prstGeom>
-          <a:noFill/>
-          <a:ln>
-            <a:noFill/>
-          </a:ln>
-          <a:extLst>
-            <a:ext uri="{909E8E84-426E-40dd-AFC4-6F175D3DCCD1}">
-              <a14:hiddenFill xmlns:a14="http://schemas.microsoft.com/office/drawing/2010/main">
-                <a:solidFill>
-                  <a:srgbClr val="FFFFFF"/>
-                </a:solidFill>
-              </a14:hiddenFill>
-            </a:ext>
-            <a:ext uri="{91240B29-F687-4f45-9708-019B960494DF}">
-              <a14:hiddenLine xmlns:a14="http://schemas.microsoft.com/office/drawing/2010/main" w="9525">
-                <a:solidFill>
-                  <a:srgbClr val="000000"/>
-                </a:solidFill>
-                <a:miter lim="800000"/>
-                <a:headEnd/>
-                <a:tailEnd/>
-              </a14:hiddenLine>
-            </a:ext>
-          </a:extLst>
-        </p:spPr>
-        <p:txBody>
-          <a:bodyPr lIns="0" tIns="0" rIns="40639" bIns="0" anchor="ctr"/>
-          <a:lstStyle/>
-          <a:p>
-            <a:pPr marL="39688" algn="ctr"/>
-            <a:r>
-              <a:rPr lang="en-US" sz="800">
-                <a:solidFill>
-                  <a:srgbClr val="ACB8C0"/>
-                </a:solidFill>
-                <a:latin typeface="Helvetica" charset="0"/>
-                <a:cs typeface="Helvetica" charset="0"/>
-                <a:sym typeface="Helvetica" charset="0"/>
-              </a:rPr>
-              <a:t>© 2011 Appcelerator, Inc.</a:t>
-            </a:r>
-          </a:p>
-        </p:txBody>
-      </p:sp>
-      <p:sp>
-        <p:nvSpPr>
           <p:cNvPr id="18438" name="Rectangle 6"/>
           <p:cNvSpPr>
             <a:spLocks noGrp="1" noChangeArrowheads="1"/>
@@ -11170,6 +11540,92 @@
               <a:latin typeface="Trebuchet MS Bold" charset="0"/>
               <a:ea typeface="ヒラギノ角ゴ ProN W6" charset="0"/>
               <a:cs typeface="ヒラギノ角ゴ ProN W6" charset="0"/>
+            </a:endParaRPr>
+          </a:p>
+        </p:txBody>
+      </p:sp>
+      <p:sp>
+        <p:nvSpPr>
+          <p:cNvPr id="8" name="Rectangle 7"/>
+          <p:cNvSpPr>
+            <a:spLocks noGrp="1" noChangeArrowheads="1"/>
+          </p:cNvSpPr>
+          <p:nvPr>
+            <p:ph idx="1"/>
+          </p:nvPr>
+        </p:nvSpPr>
+        <p:spPr>
+          <a:xfrm>
+            <a:off x="152400" y="1346200"/>
+            <a:ext cx="8229600" cy="5359400"/>
+          </a:xfrm>
+        </p:spPr>
+        <p:txBody>
+          <a:bodyPr rIns="81279"/>
+          <a:lstStyle/>
+          <a:p>
+            <a:pPr indent="0" eaLnBrk="1" hangingPunct="1"/>
+            <a:r>
+              <a:rPr lang="en-US" dirty="0" smtClean="0">
+                <a:latin typeface="Trebuchet MS" charset="0"/>
+                <a:ea typeface="ヒラギノ角ゴ ProN W3" charset="0"/>
+                <a:cs typeface="ヒラギノ角ゴ ProN W3" charset="0"/>
+              </a:rPr>
+              <a:t>Common Components are Boring</a:t>
+            </a:r>
+          </a:p>
+          <a:p>
+            <a:pPr indent="0" eaLnBrk="1" hangingPunct="1"/>
+            <a:endParaRPr lang="en-US" dirty="0">
+              <a:latin typeface="Trebuchet MS" charset="0"/>
+              <a:ea typeface="ヒラギノ角ゴ ProN W3" charset="0"/>
+              <a:cs typeface="ヒラギノ角ゴ ProN W3" charset="0"/>
+            </a:endParaRPr>
+          </a:p>
+          <a:p>
+            <a:pPr indent="0" eaLnBrk="1" hangingPunct="1"/>
+            <a:r>
+              <a:rPr lang="en-US" dirty="0" smtClean="0">
+                <a:latin typeface="Trebuchet MS" charset="0"/>
+                <a:ea typeface="ヒラギノ角ゴ ProN W3" charset="0"/>
+                <a:cs typeface="ヒラギノ角ゴ ProN W3" charset="0"/>
+              </a:rPr>
+              <a:t>What is not Branded</a:t>
+            </a:r>
+          </a:p>
+          <a:p>
+            <a:pPr indent="0" eaLnBrk="1" hangingPunct="1"/>
+            <a:endParaRPr lang="en-US" dirty="0">
+              <a:latin typeface="Trebuchet MS" charset="0"/>
+              <a:ea typeface="ヒラギノ角ゴ ProN W3" charset="0"/>
+              <a:cs typeface="ヒラギノ角ゴ ProN W3" charset="0"/>
+            </a:endParaRPr>
+          </a:p>
+          <a:p>
+            <a:pPr indent="0" eaLnBrk="1" hangingPunct="1"/>
+            <a:r>
+              <a:rPr lang="en-US" dirty="0" smtClean="0">
+                <a:latin typeface="Trebuchet MS" charset="0"/>
+                <a:ea typeface="ヒラギノ角ゴ ProN W3" charset="0"/>
+                <a:cs typeface="ヒラギノ角ゴ ProN W3" charset="0"/>
+              </a:rPr>
+              <a:t>Title &amp; Tab</a:t>
+            </a:r>
+          </a:p>
+          <a:p>
+            <a:pPr indent="0" eaLnBrk="1" hangingPunct="1"/>
+            <a:endParaRPr lang="en-US" dirty="0">
+              <a:latin typeface="Trebuchet MS" charset="0"/>
+              <a:ea typeface="ヒラギノ角ゴ ProN W3" charset="0"/>
+              <a:cs typeface="ヒラギノ角ゴ ProN W3" charset="0"/>
+            </a:endParaRPr>
+          </a:p>
+          <a:p>
+            <a:pPr indent="0" eaLnBrk="1" hangingPunct="1"/>
+            <a:endParaRPr lang="en-US" dirty="0">
+              <a:latin typeface="Trebuchet MS" charset="0"/>
+              <a:ea typeface="ヒラギノ角ゴ ProN W3" charset="0"/>
+              <a:cs typeface="ヒラギノ角ゴ ProN W3" charset="0"/>
             </a:endParaRPr>
           </a:p>
         </p:txBody>
@@ -11266,65 +11722,6 @@
           </a:extLst>
         </p:spPr>
       </p:pic>
-      <p:sp>
-        <p:nvSpPr>
-          <p:cNvPr id="18434" name="Rectangle 2"/>
-          <p:cNvSpPr>
-            <a:spLocks/>
-          </p:cNvSpPr>
-          <p:nvPr/>
-        </p:nvSpPr>
-        <p:spPr bwMode="auto">
-          <a:xfrm>
-            <a:off x="3124200" y="6696075"/>
-            <a:ext cx="2921000" cy="127000"/>
-          </a:xfrm>
-          <a:prstGeom prst="rect">
-            <a:avLst/>
-          </a:prstGeom>
-          <a:noFill/>
-          <a:ln>
-            <a:noFill/>
-          </a:ln>
-          <a:extLst>
-            <a:ext uri="{909E8E84-426E-40dd-AFC4-6F175D3DCCD1}">
-              <a14:hiddenFill xmlns:a14="http://schemas.microsoft.com/office/drawing/2010/main">
-                <a:solidFill>
-                  <a:srgbClr val="FFFFFF"/>
-                </a:solidFill>
-              </a14:hiddenFill>
-            </a:ext>
-            <a:ext uri="{91240B29-F687-4f45-9708-019B960494DF}">
-              <a14:hiddenLine xmlns:a14="http://schemas.microsoft.com/office/drawing/2010/main" w="9525">
-                <a:solidFill>
-                  <a:srgbClr val="000000"/>
-                </a:solidFill>
-                <a:miter lim="800000"/>
-                <a:headEnd/>
-                <a:tailEnd/>
-              </a14:hiddenLine>
-            </a:ext>
-          </a:extLst>
-        </p:spPr>
-        <p:txBody>
-          <a:bodyPr lIns="0" tIns="0" rIns="40639" bIns="0" anchor="ctr"/>
-          <a:lstStyle/>
-          <a:p>
-            <a:pPr marL="39688" algn="ctr"/>
-            <a:r>
-              <a:rPr lang="en-US" sz="800">
-                <a:solidFill>
-                  <a:srgbClr val="ACB8C0"/>
-                </a:solidFill>
-                <a:latin typeface="Helvetica" charset="0"/>
-                <a:cs typeface="Helvetica" charset="0"/>
-                <a:sym typeface="Helvetica" charset="0"/>
-              </a:rPr>
-              <a:t>© 2011 Appcelerator, Inc.</a:t>
-            </a:r>
-          </a:p>
-        </p:txBody>
-      </p:sp>
       <p:pic>
         <p:nvPicPr>
           <p:cNvPr id="18435" name="Picture 3"/>
@@ -11435,65 +11832,6 @@
       </p:pic>
       <p:sp>
         <p:nvSpPr>
-          <p:cNvPr id="18437" name="Rectangle 5"/>
-          <p:cNvSpPr>
-            <a:spLocks/>
-          </p:cNvSpPr>
-          <p:nvPr/>
-        </p:nvSpPr>
-        <p:spPr bwMode="auto">
-          <a:xfrm>
-            <a:off x="3124200" y="6696075"/>
-            <a:ext cx="2921000" cy="127000"/>
-          </a:xfrm>
-          <a:prstGeom prst="rect">
-            <a:avLst/>
-          </a:prstGeom>
-          <a:noFill/>
-          <a:ln>
-            <a:noFill/>
-          </a:ln>
-          <a:extLst>
-            <a:ext uri="{909E8E84-426E-40dd-AFC4-6F175D3DCCD1}">
-              <a14:hiddenFill xmlns:a14="http://schemas.microsoft.com/office/drawing/2010/main">
-                <a:solidFill>
-                  <a:srgbClr val="FFFFFF"/>
-                </a:solidFill>
-              </a14:hiddenFill>
-            </a:ext>
-            <a:ext uri="{91240B29-F687-4f45-9708-019B960494DF}">
-              <a14:hiddenLine xmlns:a14="http://schemas.microsoft.com/office/drawing/2010/main" w="9525">
-                <a:solidFill>
-                  <a:srgbClr val="000000"/>
-                </a:solidFill>
-                <a:miter lim="800000"/>
-                <a:headEnd/>
-                <a:tailEnd/>
-              </a14:hiddenLine>
-            </a:ext>
-          </a:extLst>
-        </p:spPr>
-        <p:txBody>
-          <a:bodyPr lIns="0" tIns="0" rIns="40639" bIns="0" anchor="ctr"/>
-          <a:lstStyle/>
-          <a:p>
-            <a:pPr marL="39688" algn="ctr"/>
-            <a:r>
-              <a:rPr lang="en-US" sz="800">
-                <a:solidFill>
-                  <a:srgbClr val="ACB8C0"/>
-                </a:solidFill>
-                <a:latin typeface="Helvetica" charset="0"/>
-                <a:cs typeface="Helvetica" charset="0"/>
-                <a:sym typeface="Helvetica" charset="0"/>
-              </a:rPr>
-              <a:t>© 2011 Appcelerator, Inc.</a:t>
-            </a:r>
-          </a:p>
-        </p:txBody>
-      </p:sp>
-      <p:sp>
-        <p:nvSpPr>
           <p:cNvPr id="18438" name="Rectangle 6"/>
           <p:cNvSpPr>
             <a:spLocks noGrp="1" noChangeArrowheads="1"/>
@@ -11525,6 +11863,102 @@
               <a:latin typeface="Trebuchet MS Bold" charset="0"/>
               <a:ea typeface="ヒラギノ角ゴ ProN W6" charset="0"/>
               <a:cs typeface="ヒラギノ角ゴ ProN W6" charset="0"/>
+            </a:endParaRPr>
+          </a:p>
+        </p:txBody>
+      </p:sp>
+      <p:sp>
+        <p:nvSpPr>
+          <p:cNvPr id="8" name="Rectangle 7"/>
+          <p:cNvSpPr>
+            <a:spLocks noGrp="1" noChangeArrowheads="1"/>
+          </p:cNvSpPr>
+          <p:nvPr>
+            <p:ph idx="1"/>
+          </p:nvPr>
+        </p:nvSpPr>
+        <p:spPr>
+          <a:xfrm>
+            <a:off x="152400" y="1346200"/>
+            <a:ext cx="8229600" cy="5359400"/>
+          </a:xfrm>
+        </p:spPr>
+        <p:txBody>
+          <a:bodyPr rIns="81279"/>
+          <a:lstStyle/>
+          <a:p>
+            <a:pPr indent="0" eaLnBrk="1" hangingPunct="1"/>
+            <a:r>
+              <a:rPr lang="en-US" dirty="0" smtClean="0">
+                <a:latin typeface="Trebuchet MS" charset="0"/>
+                <a:ea typeface="ヒラギノ角ゴ ProN W3" charset="0"/>
+                <a:cs typeface="ヒラギノ角ゴ ProN W3" charset="0"/>
+              </a:rPr>
+              <a:t>Use </a:t>
+            </a:r>
+            <a:r>
+              <a:rPr lang="en-US" dirty="0" err="1" smtClean="0">
+                <a:latin typeface="Trebuchet MS" charset="0"/>
+                <a:ea typeface="ヒラギノ角ゴ ProN W3" charset="0"/>
+                <a:cs typeface="ヒラギノ角ゴ ProN W3" charset="0"/>
+              </a:rPr>
+              <a:t>titleControl</a:t>
+            </a:r>
+            <a:endParaRPr lang="en-US" dirty="0" smtClean="0">
+              <a:latin typeface="Trebuchet MS" charset="0"/>
+              <a:ea typeface="ヒラギノ角ゴ ProN W3" charset="0"/>
+              <a:cs typeface="ヒラギノ角ゴ ProN W3" charset="0"/>
+            </a:endParaRPr>
+          </a:p>
+          <a:p>
+            <a:pPr indent="0" eaLnBrk="1" hangingPunct="1"/>
+            <a:endParaRPr lang="en-US" dirty="0">
+              <a:latin typeface="Trebuchet MS" charset="0"/>
+              <a:ea typeface="ヒラギノ角ゴ ProN W3" charset="0"/>
+              <a:cs typeface="ヒラギノ角ゴ ProN W3" charset="0"/>
+            </a:endParaRPr>
+          </a:p>
+          <a:p>
+            <a:pPr indent="0" eaLnBrk="1" hangingPunct="1"/>
+            <a:r>
+              <a:rPr lang="en-US" dirty="0" smtClean="0">
+                <a:latin typeface="Trebuchet MS" charset="0"/>
+                <a:ea typeface="ヒラギノ角ゴ ProN W3" charset="0"/>
+                <a:cs typeface="ヒラギノ角ゴ ProN W3" charset="0"/>
+              </a:rPr>
+              <a:t>Build on top of existing component</a:t>
+            </a:r>
+          </a:p>
+          <a:p>
+            <a:pPr indent="0" eaLnBrk="1" hangingPunct="1"/>
+            <a:endParaRPr lang="en-US" dirty="0">
+              <a:latin typeface="Trebuchet MS" charset="0"/>
+              <a:ea typeface="ヒラギノ角ゴ ProN W3" charset="0"/>
+              <a:cs typeface="ヒラギノ角ゴ ProN W3" charset="0"/>
+            </a:endParaRPr>
+          </a:p>
+          <a:p>
+            <a:pPr indent="0" eaLnBrk="1" hangingPunct="1"/>
+            <a:r>
+              <a:rPr lang="en-US" dirty="0" smtClean="0">
+                <a:latin typeface="Trebuchet MS" charset="0"/>
+                <a:ea typeface="ヒラギノ角ゴ ProN W3" charset="0"/>
+                <a:cs typeface="ヒラギノ角ゴ ProN W3" charset="0"/>
+              </a:rPr>
+              <a:t>Improve your UI based on UX testing</a:t>
+            </a:r>
+            <a:endParaRPr lang="en-US" dirty="0">
+              <a:latin typeface="Trebuchet MS" charset="0"/>
+              <a:ea typeface="ヒラギノ角ゴ ProN W3" charset="0"/>
+              <a:cs typeface="ヒラギノ角ゴ ProN W3" charset="0"/>
+            </a:endParaRPr>
+          </a:p>
+          <a:p>
+            <a:pPr indent="0" eaLnBrk="1" hangingPunct="1"/>
+            <a:endParaRPr lang="en-US" dirty="0">
+              <a:latin typeface="Trebuchet MS" charset="0"/>
+              <a:ea typeface="ヒラギノ角ゴ ProN W3" charset="0"/>
+              <a:cs typeface="ヒラギノ角ゴ ProN W3" charset="0"/>
             </a:endParaRPr>
           </a:p>
         </p:txBody>

</xml_diff>